<commit_message>
Added slides for Q1
</commit_message>
<xml_diff>
--- a/slides.pptx
+++ b/slides.pptx
@@ -1,21 +1,27 @@
 
 <file path=ppt/presentation.xml><?xml version="1.0" encoding="utf-8"?>
-<p:presentation xmlns:a="http://schemas.openxmlformats.org/drawingml/2006/main" xmlns:r="http://schemas.openxmlformats.org/officeDocument/2006/relationships" xmlns:p="http://schemas.openxmlformats.org/presentationml/2006/main" autoCompressPictures="0">
+<p:presentation xmlns:a="http://schemas.openxmlformats.org/drawingml/2006/main" xmlns:r="http://schemas.openxmlformats.org/officeDocument/2006/relationships" xmlns:p="http://schemas.openxmlformats.org/presentationml/2006/main" saveSubsetFonts="1" autoCompressPictures="0">
   <p:sldMasterIdLst>
     <p:sldMasterId id="2147483648" r:id="rId1"/>
   </p:sldMasterIdLst>
+  <p:notesMasterIdLst>
+    <p:notesMasterId r:id="rId16"/>
+  </p:notesMasterIdLst>
   <p:sldIdLst>
     <p:sldId id="256" r:id="rId2"/>
     <p:sldId id="257" r:id="rId3"/>
     <p:sldId id="258" r:id="rId4"/>
     <p:sldId id="261" r:id="rId5"/>
-    <p:sldId id="262" r:id="rId6"/>
-    <p:sldId id="263" r:id="rId7"/>
-    <p:sldId id="265" r:id="rId8"/>
-    <p:sldId id="264" r:id="rId9"/>
-    <p:sldId id="260" r:id="rId10"/>
-    <p:sldId id="259" r:id="rId11"/>
-    <p:sldId id="266" r:id="rId12"/>
+    <p:sldId id="267" r:id="rId6"/>
+    <p:sldId id="268" r:id="rId7"/>
+    <p:sldId id="269" r:id="rId8"/>
+    <p:sldId id="262" r:id="rId9"/>
+    <p:sldId id="263" r:id="rId10"/>
+    <p:sldId id="265" r:id="rId11"/>
+    <p:sldId id="264" r:id="rId12"/>
+    <p:sldId id="260" r:id="rId13"/>
+    <p:sldId id="259" r:id="rId14"/>
+    <p:sldId id="266" r:id="rId15"/>
   </p:sldIdLst>
   <p:sldSz cx="12192000" cy="6858000"/>
   <p:notesSz cx="6858000" cy="9144000"/>
@@ -114,17 +120,18 @@
       </a:defRPr>
     </a:lvl9pPr>
   </p:defaultTextStyle>
+  <p:extLst>
+    <p:ext uri="{EFAFB233-063F-42B5-8137-9DF3F51BA10A}">
+      <p15:sldGuideLst xmlns:p15="http://schemas.microsoft.com/office/powerpoint/2012/main"/>
+    </p:ext>
+  </p:extLst>
 </p:presentation>
 </file>
 
 <file path=ppt/commentAuthors.xml><?xml version="1.0" encoding="utf-8"?>
 <p:cmAuthorLst xmlns:a="http://schemas.openxmlformats.org/drawingml/2006/main" xmlns:r="http://schemas.openxmlformats.org/officeDocument/2006/relationships" xmlns:p="http://schemas.openxmlformats.org/presentationml/2006/main">
   <p:cmAuthor id="1" name="Derek Kelley" initials="DK" lastIdx="1" clrIdx="0">
-    <p:extLst>
-      <p:ext uri="{19B8F6BF-5375-455C-9EA6-DF929625EA0E}">
-        <p15:presenceInfo xmlns:p15="http://schemas.microsoft.com/office/powerpoint/2012/main" userId="ddadf72a29ac747d" providerId="Windows Live"/>
-      </p:ext>
-    </p:extLst>
+    <p:extLst/>
   </p:cmAuthor>
 </p:cmAuthorLst>
 </file>
@@ -141,6 +148,356 @@
     </p:extLst>
   </p:cm>
 </p:cmLst>
+</file>
+
+<file path=ppt/notesMasters/notesMaster1.xml><?xml version="1.0" encoding="utf-8"?>
+<p:notesMaster xmlns:a="http://schemas.openxmlformats.org/drawingml/2006/main" xmlns:r="http://schemas.openxmlformats.org/officeDocument/2006/relationships" xmlns:p="http://schemas.openxmlformats.org/presentationml/2006/main">
+  <p:cSld>
+    <p:bg>
+      <p:bgRef idx="1001">
+        <a:schemeClr val="bg1"/>
+      </p:bgRef>
+    </p:bg>
+    <p:spTree>
+      <p:nvGrpSpPr>
+        <p:cNvPr id="1" name=""/>
+        <p:cNvGrpSpPr/>
+        <p:nvPr/>
+      </p:nvGrpSpPr>
+      <p:grpSpPr>
+        <a:xfrm>
+          <a:off x="0" y="0"/>
+          <a:ext cx="0" cy="0"/>
+          <a:chOff x="0" y="0"/>
+          <a:chExt cx="0" cy="0"/>
+        </a:xfrm>
+      </p:grpSpPr>
+      <p:sp>
+        <p:nvSpPr>
+          <p:cNvPr id="2" name="Header Placeholder 1"/>
+          <p:cNvSpPr>
+            <a:spLocks noGrp="1"/>
+          </p:cNvSpPr>
+          <p:nvPr>
+            <p:ph type="hdr" sz="quarter"/>
+          </p:nvPr>
+        </p:nvSpPr>
+        <p:spPr>
+          <a:xfrm>
+            <a:off x="0" y="0"/>
+            <a:ext cx="2971800" cy="458788"/>
+          </a:xfrm>
+          <a:prstGeom prst="rect">
+            <a:avLst/>
+          </a:prstGeom>
+        </p:spPr>
+        <p:txBody>
+          <a:bodyPr vert="horz" lIns="91440" tIns="45720" rIns="91440" bIns="45720" rtlCol="0"/>
+          <a:lstStyle>
+            <a:lvl1pPr algn="l">
+              <a:defRPr sz="1200"/>
+            </a:lvl1pPr>
+          </a:lstStyle>
+          <a:p>
+            <a:endParaRPr lang="en-US"/>
+          </a:p>
+        </p:txBody>
+      </p:sp>
+      <p:sp>
+        <p:nvSpPr>
+          <p:cNvPr id="3" name="Date Placeholder 2"/>
+          <p:cNvSpPr>
+            <a:spLocks noGrp="1"/>
+          </p:cNvSpPr>
+          <p:nvPr>
+            <p:ph type="dt" idx="1"/>
+          </p:nvPr>
+        </p:nvSpPr>
+        <p:spPr>
+          <a:xfrm>
+            <a:off x="3884613" y="0"/>
+            <a:ext cx="2971800" cy="458788"/>
+          </a:xfrm>
+          <a:prstGeom prst="rect">
+            <a:avLst/>
+          </a:prstGeom>
+        </p:spPr>
+        <p:txBody>
+          <a:bodyPr vert="horz" lIns="91440" tIns="45720" rIns="91440" bIns="45720" rtlCol="0"/>
+          <a:lstStyle>
+            <a:lvl1pPr algn="r">
+              <a:defRPr sz="1200"/>
+            </a:lvl1pPr>
+          </a:lstStyle>
+          <a:p>
+            <a:fld id="{0E8BCBB7-1E49-2544-B319-6D1ADDE650A6}" type="datetimeFigureOut">
+              <a:rPr lang="en-US" smtClean="0"/>
+              <a:t>3/14/20</a:t>
+            </a:fld>
+            <a:endParaRPr lang="en-US"/>
+          </a:p>
+        </p:txBody>
+      </p:sp>
+      <p:sp>
+        <p:nvSpPr>
+          <p:cNvPr id="4" name="Slide Image Placeholder 3"/>
+          <p:cNvSpPr>
+            <a:spLocks noGrp="1" noRot="1" noChangeAspect="1"/>
+          </p:cNvSpPr>
+          <p:nvPr>
+            <p:ph type="sldImg" idx="2"/>
+          </p:nvPr>
+        </p:nvSpPr>
+        <p:spPr>
+          <a:xfrm>
+            <a:off x="685800" y="1143000"/>
+            <a:ext cx="5486400" cy="3086100"/>
+          </a:xfrm>
+          <a:prstGeom prst="rect">
+            <a:avLst/>
+          </a:prstGeom>
+          <a:noFill/>
+          <a:ln w="12700">
+            <a:solidFill>
+              <a:prstClr val="black"/>
+            </a:solidFill>
+          </a:ln>
+        </p:spPr>
+        <p:txBody>
+          <a:bodyPr vert="horz" lIns="91440" tIns="45720" rIns="91440" bIns="45720" rtlCol="0" anchor="ctr"/>
+          <a:lstStyle/>
+          <a:p>
+            <a:endParaRPr lang="en-US"/>
+          </a:p>
+        </p:txBody>
+      </p:sp>
+      <p:sp>
+        <p:nvSpPr>
+          <p:cNvPr id="5" name="Notes Placeholder 4"/>
+          <p:cNvSpPr>
+            <a:spLocks noGrp="1"/>
+          </p:cNvSpPr>
+          <p:nvPr>
+            <p:ph type="body" sz="quarter" idx="3"/>
+          </p:nvPr>
+        </p:nvSpPr>
+        <p:spPr>
+          <a:xfrm>
+            <a:off x="685800" y="4400550"/>
+            <a:ext cx="5486400" cy="3600450"/>
+          </a:xfrm>
+          <a:prstGeom prst="rect">
+            <a:avLst/>
+          </a:prstGeom>
+        </p:spPr>
+        <p:txBody>
+          <a:bodyPr vert="horz" lIns="91440" tIns="45720" rIns="91440" bIns="45720" rtlCol="0"/>
+          <a:lstStyle/>
+          <a:p>
+            <a:pPr lvl="0"/>
+            <a:r>
+              <a:rPr lang="en-US" smtClean="0"/>
+              <a:t>Click to edit Master text styles</a:t>
+            </a:r>
+          </a:p>
+          <a:p>
+            <a:pPr lvl="1"/>
+            <a:r>
+              <a:rPr lang="en-US" smtClean="0"/>
+              <a:t>Second level</a:t>
+            </a:r>
+          </a:p>
+          <a:p>
+            <a:pPr lvl="2"/>
+            <a:r>
+              <a:rPr lang="en-US" smtClean="0"/>
+              <a:t>Third level</a:t>
+            </a:r>
+          </a:p>
+          <a:p>
+            <a:pPr lvl="3"/>
+            <a:r>
+              <a:rPr lang="en-US" smtClean="0"/>
+              <a:t>Fourth level</a:t>
+            </a:r>
+          </a:p>
+          <a:p>
+            <a:pPr lvl="4"/>
+            <a:r>
+              <a:rPr lang="en-US" smtClean="0"/>
+              <a:t>Fifth level</a:t>
+            </a:r>
+            <a:endParaRPr lang="en-US"/>
+          </a:p>
+        </p:txBody>
+      </p:sp>
+      <p:sp>
+        <p:nvSpPr>
+          <p:cNvPr id="6" name="Footer Placeholder 5"/>
+          <p:cNvSpPr>
+            <a:spLocks noGrp="1"/>
+          </p:cNvSpPr>
+          <p:nvPr>
+            <p:ph type="ftr" sz="quarter" idx="4"/>
+          </p:nvPr>
+        </p:nvSpPr>
+        <p:spPr>
+          <a:xfrm>
+            <a:off x="0" y="8685213"/>
+            <a:ext cx="2971800" cy="458787"/>
+          </a:xfrm>
+          <a:prstGeom prst="rect">
+            <a:avLst/>
+          </a:prstGeom>
+        </p:spPr>
+        <p:txBody>
+          <a:bodyPr vert="horz" lIns="91440" tIns="45720" rIns="91440" bIns="45720" rtlCol="0" anchor="b"/>
+          <a:lstStyle>
+            <a:lvl1pPr algn="l">
+              <a:defRPr sz="1200"/>
+            </a:lvl1pPr>
+          </a:lstStyle>
+          <a:p>
+            <a:endParaRPr lang="en-US"/>
+          </a:p>
+        </p:txBody>
+      </p:sp>
+      <p:sp>
+        <p:nvSpPr>
+          <p:cNvPr id="7" name="Slide Number Placeholder 6"/>
+          <p:cNvSpPr>
+            <a:spLocks noGrp="1"/>
+          </p:cNvSpPr>
+          <p:nvPr>
+            <p:ph type="sldNum" sz="quarter" idx="5"/>
+          </p:nvPr>
+        </p:nvSpPr>
+        <p:spPr>
+          <a:xfrm>
+            <a:off x="3884613" y="8685213"/>
+            <a:ext cx="2971800" cy="458787"/>
+          </a:xfrm>
+          <a:prstGeom prst="rect">
+            <a:avLst/>
+          </a:prstGeom>
+        </p:spPr>
+        <p:txBody>
+          <a:bodyPr vert="horz" lIns="91440" tIns="45720" rIns="91440" bIns="45720" rtlCol="0" anchor="b"/>
+          <a:lstStyle>
+            <a:lvl1pPr algn="r">
+              <a:defRPr sz="1200"/>
+            </a:lvl1pPr>
+          </a:lstStyle>
+          <a:p>
+            <a:fld id="{CE8E5D33-4C95-2C4E-B6AC-26388116DD93}" type="slidenum">
+              <a:rPr lang="en-US" smtClean="0"/>
+              <a:t>‹#›</a:t>
+            </a:fld>
+            <a:endParaRPr lang="en-US"/>
+          </a:p>
+        </p:txBody>
+      </p:sp>
+    </p:spTree>
+    <p:extLst>
+      <p:ext uri="{BB962C8B-B14F-4D97-AF65-F5344CB8AC3E}">
+        <p14:creationId xmlns:p14="http://schemas.microsoft.com/office/powerpoint/2010/main" val="1367731206"/>
+      </p:ext>
+    </p:extLst>
+  </p:cSld>
+  <p:clrMap bg1="lt1" tx1="dk1" bg2="lt2" tx2="dk2" accent1="accent1" accent2="accent2" accent3="accent3" accent4="accent4" accent5="accent5" accent6="accent6" hlink="hlink" folHlink="folHlink"/>
+  <p:notesStyle>
+    <a:lvl1pPr marL="0" algn="l" defTabSz="914400" rtl="0" eaLnBrk="1" latinLnBrk="0" hangingPunct="1">
+      <a:defRPr sz="1200" kern="1200">
+        <a:solidFill>
+          <a:schemeClr val="tx1"/>
+        </a:solidFill>
+        <a:latin typeface="+mn-lt"/>
+        <a:ea typeface="+mn-ea"/>
+        <a:cs typeface="+mn-cs"/>
+      </a:defRPr>
+    </a:lvl1pPr>
+    <a:lvl2pPr marL="457200" algn="l" defTabSz="914400" rtl="0" eaLnBrk="1" latinLnBrk="0" hangingPunct="1">
+      <a:defRPr sz="1200" kern="1200">
+        <a:solidFill>
+          <a:schemeClr val="tx1"/>
+        </a:solidFill>
+        <a:latin typeface="+mn-lt"/>
+        <a:ea typeface="+mn-ea"/>
+        <a:cs typeface="+mn-cs"/>
+      </a:defRPr>
+    </a:lvl2pPr>
+    <a:lvl3pPr marL="914400" algn="l" defTabSz="914400" rtl="0" eaLnBrk="1" latinLnBrk="0" hangingPunct="1">
+      <a:defRPr sz="1200" kern="1200">
+        <a:solidFill>
+          <a:schemeClr val="tx1"/>
+        </a:solidFill>
+        <a:latin typeface="+mn-lt"/>
+        <a:ea typeface="+mn-ea"/>
+        <a:cs typeface="+mn-cs"/>
+      </a:defRPr>
+    </a:lvl3pPr>
+    <a:lvl4pPr marL="1371600" algn="l" defTabSz="914400" rtl="0" eaLnBrk="1" latinLnBrk="0" hangingPunct="1">
+      <a:defRPr sz="1200" kern="1200">
+        <a:solidFill>
+          <a:schemeClr val="tx1"/>
+        </a:solidFill>
+        <a:latin typeface="+mn-lt"/>
+        <a:ea typeface="+mn-ea"/>
+        <a:cs typeface="+mn-cs"/>
+      </a:defRPr>
+    </a:lvl4pPr>
+    <a:lvl5pPr marL="1828800" algn="l" defTabSz="914400" rtl="0" eaLnBrk="1" latinLnBrk="0" hangingPunct="1">
+      <a:defRPr sz="1200" kern="1200">
+        <a:solidFill>
+          <a:schemeClr val="tx1"/>
+        </a:solidFill>
+        <a:latin typeface="+mn-lt"/>
+        <a:ea typeface="+mn-ea"/>
+        <a:cs typeface="+mn-cs"/>
+      </a:defRPr>
+    </a:lvl5pPr>
+    <a:lvl6pPr marL="2286000" algn="l" defTabSz="914400" rtl="0" eaLnBrk="1" latinLnBrk="0" hangingPunct="1">
+      <a:defRPr sz="1200" kern="1200">
+        <a:solidFill>
+          <a:schemeClr val="tx1"/>
+        </a:solidFill>
+        <a:latin typeface="+mn-lt"/>
+        <a:ea typeface="+mn-ea"/>
+        <a:cs typeface="+mn-cs"/>
+      </a:defRPr>
+    </a:lvl6pPr>
+    <a:lvl7pPr marL="2743200" algn="l" defTabSz="914400" rtl="0" eaLnBrk="1" latinLnBrk="0" hangingPunct="1">
+      <a:defRPr sz="1200" kern="1200">
+        <a:solidFill>
+          <a:schemeClr val="tx1"/>
+        </a:solidFill>
+        <a:latin typeface="+mn-lt"/>
+        <a:ea typeface="+mn-ea"/>
+        <a:cs typeface="+mn-cs"/>
+      </a:defRPr>
+    </a:lvl7pPr>
+    <a:lvl8pPr marL="3200400" algn="l" defTabSz="914400" rtl="0" eaLnBrk="1" latinLnBrk="0" hangingPunct="1">
+      <a:defRPr sz="1200" kern="1200">
+        <a:solidFill>
+          <a:schemeClr val="tx1"/>
+        </a:solidFill>
+        <a:latin typeface="+mn-lt"/>
+        <a:ea typeface="+mn-ea"/>
+        <a:cs typeface="+mn-cs"/>
+      </a:defRPr>
+    </a:lvl8pPr>
+    <a:lvl9pPr marL="3657600" algn="l" defTabSz="914400" rtl="0" eaLnBrk="1" latinLnBrk="0" hangingPunct="1">
+      <a:defRPr sz="1200" kern="1200">
+        <a:solidFill>
+          <a:schemeClr val="tx1"/>
+        </a:solidFill>
+        <a:latin typeface="+mn-lt"/>
+        <a:ea typeface="+mn-ea"/>
+        <a:cs typeface="+mn-cs"/>
+      </a:defRPr>
+    </a:lvl9pPr>
+  </p:notesStyle>
+</p:notesMaster>
 </file>
 
 <file path=ppt/slideLayouts/slideLayout1.xml><?xml version="1.0" encoding="utf-8"?>
@@ -335,7 +692,7 @@
             <a:fld id="{B61BEF0D-F0BB-DE4B-95CE-6DB70DBA9567}" type="datetimeFigureOut">
               <a:rPr lang="en-US" dirty="0"/>
               <a:pPr/>
-              <a:t>3/12/2020</a:t>
+              <a:t>3/14/20</a:t>
             </a:fld>
             <a:endParaRPr lang="en-US" dirty="0"/>
           </a:p>
@@ -768,7 +1125,7 @@
             <a:fld id="{B61BEF0D-F0BB-DE4B-95CE-6DB70DBA9567}" type="datetimeFigureOut">
               <a:rPr lang="en-US" dirty="0"/>
               <a:pPr/>
-              <a:t>3/12/2020</a:t>
+              <a:t>3/14/20</a:t>
             </a:fld>
             <a:endParaRPr lang="en-US" dirty="0"/>
           </a:p>
@@ -1015,7 +1372,7 @@
             <a:fld id="{B61BEF0D-F0BB-DE4B-95CE-6DB70DBA9567}" type="datetimeFigureOut">
               <a:rPr lang="en-US" dirty="0"/>
               <a:pPr/>
-              <a:t>3/12/2020</a:t>
+              <a:t>3/14/20</a:t>
             </a:fld>
             <a:endParaRPr lang="en-US" dirty="0"/>
           </a:p>
@@ -1320,7 +1677,7 @@
             <a:fld id="{B61BEF0D-F0BB-DE4B-95CE-6DB70DBA9567}" type="datetimeFigureOut">
               <a:rPr lang="en-US" dirty="0"/>
               <a:pPr/>
-              <a:t>3/12/2020</a:t>
+              <a:t>3/14/20</a:t>
             </a:fld>
             <a:endParaRPr lang="en-US" dirty="0"/>
           </a:p>
@@ -1635,7 +1992,7 @@
             <a:fld id="{B61BEF0D-F0BB-DE4B-95CE-6DB70DBA9567}" type="datetimeFigureOut">
               <a:rPr lang="en-US" dirty="0"/>
               <a:pPr/>
-              <a:t>3/12/2020</a:t>
+              <a:t>3/14/20</a:t>
             </a:fld>
             <a:endParaRPr lang="en-US" dirty="0"/>
           </a:p>
@@ -1934,7 +2291,7 @@
             <a:fld id="{B61BEF0D-F0BB-DE4B-95CE-6DB70DBA9567}" type="datetimeFigureOut">
               <a:rPr lang="en-US" dirty="0"/>
               <a:pPr/>
-              <a:t>3/12/2020</a:t>
+              <a:t>3/14/20</a:t>
             </a:fld>
             <a:endParaRPr lang="en-US" dirty="0"/>
           </a:p>
@@ -2298,7 +2655,7 @@
             <a:fld id="{B61BEF0D-F0BB-DE4B-95CE-6DB70DBA9567}" type="datetimeFigureOut">
               <a:rPr lang="en-US" dirty="0"/>
               <a:pPr/>
-              <a:t>3/12/2020</a:t>
+              <a:t>3/14/20</a:t>
             </a:fld>
             <a:endParaRPr lang="en-US" dirty="0"/>
           </a:p>
@@ -2469,7 +2826,7 @@
             <a:fld id="{B61BEF0D-F0BB-DE4B-95CE-6DB70DBA9567}" type="datetimeFigureOut">
               <a:rPr lang="en-US" dirty="0"/>
               <a:pPr/>
-              <a:t>3/12/2020</a:t>
+              <a:t>3/14/20</a:t>
             </a:fld>
             <a:endParaRPr lang="en-US" dirty="0"/>
           </a:p>
@@ -2646,7 +3003,7 @@
             <a:fld id="{B61BEF0D-F0BB-DE4B-95CE-6DB70DBA9567}" type="datetimeFigureOut">
               <a:rPr lang="en-US" dirty="0"/>
               <a:pPr/>
-              <a:t>3/12/2020</a:t>
+              <a:t>3/14/20</a:t>
             </a:fld>
             <a:endParaRPr lang="en-US" dirty="0"/>
           </a:p>
@@ -2813,7 +3170,7 @@
             <a:fld id="{B61BEF0D-F0BB-DE4B-95CE-6DB70DBA9567}" type="datetimeFigureOut">
               <a:rPr lang="en-US" dirty="0"/>
               <a:pPr/>
-              <a:t>3/12/2020</a:t>
+              <a:t>3/14/20</a:t>
             </a:fld>
             <a:endParaRPr lang="en-US" dirty="0"/>
           </a:p>
@@ -3060,7 +3417,7 @@
             <a:fld id="{B61BEF0D-F0BB-DE4B-95CE-6DB70DBA9567}" type="datetimeFigureOut">
               <a:rPr lang="en-US" dirty="0"/>
               <a:pPr/>
-              <a:t>3/12/2020</a:t>
+              <a:t>3/14/20</a:t>
             </a:fld>
             <a:endParaRPr lang="en-US" dirty="0"/>
           </a:p>
@@ -3293,7 +3650,7 @@
             <a:fld id="{B61BEF0D-F0BB-DE4B-95CE-6DB70DBA9567}" type="datetimeFigureOut">
               <a:rPr lang="en-US" dirty="0"/>
               <a:pPr/>
-              <a:t>3/12/2020</a:t>
+              <a:t>3/14/20</a:t>
             </a:fld>
             <a:endParaRPr lang="en-US" dirty="0"/>
           </a:p>
@@ -3672,7 +4029,7 @@
             <a:fld id="{B61BEF0D-F0BB-DE4B-95CE-6DB70DBA9567}" type="datetimeFigureOut">
               <a:rPr lang="en-US" dirty="0"/>
               <a:pPr/>
-              <a:t>3/12/2020</a:t>
+              <a:t>3/14/20</a:t>
             </a:fld>
             <a:endParaRPr lang="en-US" dirty="0"/>
           </a:p>
@@ -3787,7 +4144,7 @@
             <a:fld id="{B61BEF0D-F0BB-DE4B-95CE-6DB70DBA9567}" type="datetimeFigureOut">
               <a:rPr lang="en-US" dirty="0"/>
               <a:pPr/>
-              <a:t>3/12/2020</a:t>
+              <a:t>3/14/20</a:t>
             </a:fld>
             <a:endParaRPr lang="en-US" dirty="0"/>
           </a:p>
@@ -3879,7 +4236,7 @@
             <a:fld id="{B61BEF0D-F0BB-DE4B-95CE-6DB70DBA9567}" type="datetimeFigureOut">
               <a:rPr lang="en-US" dirty="0"/>
               <a:pPr/>
-              <a:t>3/12/2020</a:t>
+              <a:t>3/14/20</a:t>
             </a:fld>
             <a:endParaRPr lang="en-US" dirty="0"/>
           </a:p>
@@ -4131,7 +4488,7 @@
             <a:fld id="{B61BEF0D-F0BB-DE4B-95CE-6DB70DBA9567}" type="datetimeFigureOut">
               <a:rPr lang="en-US" dirty="0"/>
               <a:pPr/>
-              <a:t>3/12/2020</a:t>
+              <a:t>3/14/20</a:t>
             </a:fld>
             <a:endParaRPr lang="en-US" dirty="0"/>
           </a:p>
@@ -4411,7 +4768,7 @@
             <a:fld id="{B61BEF0D-F0BB-DE4B-95CE-6DB70DBA9567}" type="datetimeFigureOut">
               <a:rPr lang="en-US" dirty="0"/>
               <a:pPr/>
-              <a:t>3/12/2020</a:t>
+              <a:t>3/14/20</a:t>
             </a:fld>
             <a:endParaRPr lang="en-US" dirty="0"/>
           </a:p>
@@ -4814,7 +5171,7 @@
             <a:fld id="{B61BEF0D-F0BB-DE4B-95CE-6DB70DBA9567}" type="datetimeFigureOut">
               <a:rPr lang="en-US" dirty="0"/>
               <a:pPr/>
-              <a:t>3/12/2020</a:t>
+              <a:t>3/14/20</a:t>
             </a:fld>
             <a:endParaRPr lang="en-US" dirty="0"/>
           </a:p>
@@ -5350,7 +5707,7 @@
           <p:cNvPr id="2" name="Title 1">
             <a:extLst>
               <a:ext uri="{FF2B5EF4-FFF2-40B4-BE49-F238E27FC236}">
-                <a16:creationId xmlns:a16="http://schemas.microsoft.com/office/drawing/2014/main" id="{FFBC5A55-1AE3-48C9-ACC9-BDAB23FA566D}"/>
+                <a16:creationId xmlns:a16="http://schemas.microsoft.com/office/drawing/2014/main" xmlns="" id="{FFBC5A55-1AE3-48C9-ACC9-BDAB23FA566D}"/>
               </a:ext>
             </a:extLst>
           </p:cNvPr>
@@ -5378,7 +5735,7 @@
           <p:cNvPr id="3" name="Subtitle 2">
             <a:extLst>
               <a:ext uri="{FF2B5EF4-FFF2-40B4-BE49-F238E27FC236}">
-                <a16:creationId xmlns:a16="http://schemas.microsoft.com/office/drawing/2014/main" id="{FA5B921E-5D5F-471D-9283-FA951E419B38}"/>
+                <a16:creationId xmlns:a16="http://schemas.microsoft.com/office/drawing/2014/main" xmlns="" id="{FA5B921E-5D5F-471D-9283-FA951E419B38}"/>
               </a:ext>
             </a:extLst>
           </p:cNvPr>
@@ -5496,7 +5853,7 @@
           <p:cNvPr id="2" name="Title 1">
             <a:extLst>
               <a:ext uri="{FF2B5EF4-FFF2-40B4-BE49-F238E27FC236}">
-                <a16:creationId xmlns:a16="http://schemas.microsoft.com/office/drawing/2014/main" id="{00846977-A750-4BB6-9AE6-AEB2DC7066DF}"/>
+                <a16:creationId xmlns:a16="http://schemas.microsoft.com/office/drawing/2014/main" xmlns="" id="{00846977-A750-4BB6-9AE6-AEB2DC7066DF}"/>
               </a:ext>
             </a:extLst>
           </p:cNvPr>
@@ -5519,7 +5876,7 @@
           <a:p>
             <a:r>
               <a:rPr lang="en-US" dirty="0"/>
-              <a:t>Obstacles</a:t>
+              <a:t>Q3</a:t>
             </a:r>
           </a:p>
         </p:txBody>
@@ -5529,7 +5886,7 @@
           <p:cNvPr id="3" name="Content Placeholder 2">
             <a:extLst>
               <a:ext uri="{FF2B5EF4-FFF2-40B4-BE49-F238E27FC236}">
-                <a16:creationId xmlns:a16="http://schemas.microsoft.com/office/drawing/2014/main" id="{F97BA237-BBF0-49FD-B184-71910E0D1F83}"/>
+                <a16:creationId xmlns:a16="http://schemas.microsoft.com/office/drawing/2014/main" xmlns="" id="{F97BA237-BBF0-49FD-B184-71910E0D1F83}"/>
               </a:ext>
             </a:extLst>
           </p:cNvPr>
@@ -5557,51 +5914,18 @@
               <a:buFont typeface="+mj-lt"/>
               <a:buAutoNum type="arabicPeriod"/>
             </a:pPr>
-            <a:r>
-              <a:rPr lang="en-US" sz="2400" dirty="0">
-                <a:solidFill>
-                  <a:schemeClr val="bg1"/>
-                </a:solidFill>
-              </a:rPr>
-              <a:t>Filling NULL values</a:t>
-            </a:r>
-          </a:p>
-          <a:p>
-            <a:pPr marL="457200" indent="-457200">
-              <a:buClrTx/>
-              <a:buFont typeface="+mj-lt"/>
-              <a:buAutoNum type="arabicPeriod"/>
-            </a:pPr>
-            <a:r>
-              <a:rPr lang="en-US" sz="2400" dirty="0">
-                <a:solidFill>
-                  <a:schemeClr val="bg1"/>
-                </a:solidFill>
-              </a:rPr>
-              <a:t>Regular Expressions</a:t>
-            </a:r>
-          </a:p>
-          <a:p>
-            <a:pPr marL="457200" indent="-457200">
-              <a:buClrTx/>
-              <a:buFont typeface="+mj-lt"/>
-              <a:buAutoNum type="arabicPeriod"/>
-            </a:pPr>
-            <a:r>
-              <a:rPr lang="en-US" sz="2400" dirty="0">
-                <a:solidFill>
-                  <a:schemeClr val="bg1"/>
-                </a:solidFill>
-              </a:rPr>
-              <a:t>TBD</a:t>
-            </a:r>
+            <a:endParaRPr lang="en-US" sz="2400" dirty="0">
+              <a:solidFill>
+                <a:schemeClr val="bg1"/>
+              </a:solidFill>
+            </a:endParaRPr>
           </a:p>
         </p:txBody>
       </p:sp>
     </p:spTree>
     <p:extLst>
       <p:ext uri="{BB962C8B-B14F-4D97-AF65-F5344CB8AC3E}">
-        <p14:creationId xmlns:p14="http://schemas.microsoft.com/office/powerpoint/2010/main" val="3205346752"/>
+        <p14:creationId xmlns:p14="http://schemas.microsoft.com/office/powerpoint/2010/main" val="1280595349"/>
       </p:ext>
     </p:extLst>
   </p:cSld>
@@ -5633,7 +5957,370 @@
           <p:cNvPr id="2" name="Title 1">
             <a:extLst>
               <a:ext uri="{FF2B5EF4-FFF2-40B4-BE49-F238E27FC236}">
-                <a16:creationId xmlns:a16="http://schemas.microsoft.com/office/drawing/2014/main" id="{015E36F3-CFD3-4F0B-ACE1-6FFBBC14C8FE}"/>
+                <a16:creationId xmlns:a16="http://schemas.microsoft.com/office/drawing/2014/main" xmlns="" id="{00846977-A750-4BB6-9AE6-AEB2DC7066DF}"/>
+              </a:ext>
+            </a:extLst>
+          </p:cNvPr>
+          <p:cNvSpPr>
+            <a:spLocks noGrp="1"/>
+          </p:cNvSpPr>
+          <p:nvPr>
+            <p:ph type="title"/>
+          </p:nvPr>
+        </p:nvSpPr>
+        <p:spPr>
+          <a:xfrm>
+            <a:off x="684212" y="703874"/>
+            <a:ext cx="8534400" cy="1507067"/>
+          </a:xfrm>
+        </p:spPr>
+        <p:txBody>
+          <a:bodyPr/>
+          <a:lstStyle/>
+          <a:p>
+            <a:r>
+              <a:rPr lang="en-US" dirty="0"/>
+              <a:t>Q4</a:t>
+            </a:r>
+          </a:p>
+        </p:txBody>
+      </p:sp>
+      <p:sp>
+        <p:nvSpPr>
+          <p:cNvPr id="3" name="Content Placeholder 2">
+            <a:extLst>
+              <a:ext uri="{FF2B5EF4-FFF2-40B4-BE49-F238E27FC236}">
+                <a16:creationId xmlns:a16="http://schemas.microsoft.com/office/drawing/2014/main" xmlns="" id="{F97BA237-BBF0-49FD-B184-71910E0D1F83}"/>
+              </a:ext>
+            </a:extLst>
+          </p:cNvPr>
+          <p:cNvSpPr>
+            <a:spLocks noGrp="1"/>
+          </p:cNvSpPr>
+          <p:nvPr>
+            <p:ph idx="1"/>
+          </p:nvPr>
+        </p:nvSpPr>
+        <p:spPr>
+          <a:xfrm>
+            <a:off x="684212" y="2393878"/>
+            <a:ext cx="8534400" cy="2482541"/>
+          </a:xfrm>
+        </p:spPr>
+        <p:txBody>
+          <a:bodyPr>
+            <a:normAutofit/>
+          </a:bodyPr>
+          <a:lstStyle/>
+          <a:p>
+            <a:pPr marL="457200" indent="-457200">
+              <a:buClrTx/>
+              <a:buFont typeface="+mj-lt"/>
+              <a:buAutoNum type="arabicPeriod"/>
+            </a:pPr>
+            <a:endParaRPr lang="en-US" sz="2400" dirty="0">
+              <a:solidFill>
+                <a:schemeClr val="bg1"/>
+              </a:solidFill>
+            </a:endParaRPr>
+          </a:p>
+        </p:txBody>
+      </p:sp>
+    </p:spTree>
+    <p:extLst>
+      <p:ext uri="{BB962C8B-B14F-4D97-AF65-F5344CB8AC3E}">
+        <p14:creationId xmlns:p14="http://schemas.microsoft.com/office/powerpoint/2010/main" val="2274920983"/>
+      </p:ext>
+    </p:extLst>
+  </p:cSld>
+  <p:clrMapOvr>
+    <a:masterClrMapping/>
+  </p:clrMapOvr>
+</p:sld>
+</file>
+
+<file path=ppt/slides/slide12.xml><?xml version="1.0" encoding="utf-8"?>
+<p:sld xmlns:a="http://schemas.openxmlformats.org/drawingml/2006/main" xmlns:r="http://schemas.openxmlformats.org/officeDocument/2006/relationships" xmlns:p="http://schemas.openxmlformats.org/presentationml/2006/main">
+  <p:cSld>
+    <p:spTree>
+      <p:nvGrpSpPr>
+        <p:cNvPr id="1" name=""/>
+        <p:cNvGrpSpPr/>
+        <p:nvPr/>
+      </p:nvGrpSpPr>
+      <p:grpSpPr>
+        <a:xfrm>
+          <a:off x="0" y="0"/>
+          <a:ext cx="0" cy="0"/>
+          <a:chOff x="0" y="0"/>
+          <a:chExt cx="0" cy="0"/>
+        </a:xfrm>
+      </p:grpSpPr>
+      <p:sp>
+        <p:nvSpPr>
+          <p:cNvPr id="2" name="Title 1">
+            <a:extLst>
+              <a:ext uri="{FF2B5EF4-FFF2-40B4-BE49-F238E27FC236}">
+                <a16:creationId xmlns:a16="http://schemas.microsoft.com/office/drawing/2014/main" xmlns="" id="{00846977-A750-4BB6-9AE6-AEB2DC7066DF}"/>
+              </a:ext>
+            </a:extLst>
+          </p:cNvPr>
+          <p:cNvSpPr>
+            <a:spLocks noGrp="1"/>
+          </p:cNvSpPr>
+          <p:nvPr>
+            <p:ph type="title"/>
+          </p:nvPr>
+        </p:nvSpPr>
+        <p:spPr>
+          <a:xfrm>
+            <a:off x="684212" y="703874"/>
+            <a:ext cx="8534400" cy="1507067"/>
+          </a:xfrm>
+        </p:spPr>
+        <p:txBody>
+          <a:bodyPr/>
+          <a:lstStyle/>
+          <a:p>
+            <a:r>
+              <a:rPr lang="en-US" dirty="0"/>
+              <a:t>What we learned</a:t>
+            </a:r>
+          </a:p>
+        </p:txBody>
+      </p:sp>
+      <p:sp>
+        <p:nvSpPr>
+          <p:cNvPr id="3" name="Content Placeholder 2">
+            <a:extLst>
+              <a:ext uri="{FF2B5EF4-FFF2-40B4-BE49-F238E27FC236}">
+                <a16:creationId xmlns:a16="http://schemas.microsoft.com/office/drawing/2014/main" xmlns="" id="{F97BA237-BBF0-49FD-B184-71910E0D1F83}"/>
+              </a:ext>
+            </a:extLst>
+          </p:cNvPr>
+          <p:cNvSpPr>
+            <a:spLocks noGrp="1"/>
+          </p:cNvSpPr>
+          <p:nvPr>
+            <p:ph idx="1"/>
+          </p:nvPr>
+        </p:nvSpPr>
+        <p:spPr>
+          <a:xfrm>
+            <a:off x="684212" y="2393878"/>
+            <a:ext cx="8534400" cy="2482541"/>
+          </a:xfrm>
+        </p:spPr>
+        <p:txBody>
+          <a:bodyPr anchor="t">
+            <a:normAutofit/>
+          </a:bodyPr>
+          <a:lstStyle/>
+          <a:p>
+            <a:pPr marL="457200" indent="-457200">
+              <a:buClrTx/>
+              <a:buFont typeface="+mj-lt"/>
+              <a:buAutoNum type="arabicPeriod"/>
+            </a:pPr>
+            <a:r>
+              <a:rPr lang="en-US" sz="2400" dirty="0">
+                <a:solidFill>
+                  <a:schemeClr val="bg1"/>
+                </a:solidFill>
+              </a:rPr>
+              <a:t>Conclusions from Questions …</a:t>
+            </a:r>
+          </a:p>
+          <a:p>
+            <a:pPr marL="457200" indent="-457200">
+              <a:buClrTx/>
+              <a:buFont typeface="+mj-lt"/>
+              <a:buAutoNum type="arabicPeriod"/>
+            </a:pPr>
+            <a:r>
+              <a:rPr lang="en-US" sz="2400" dirty="0">
+                <a:solidFill>
+                  <a:schemeClr val="bg1"/>
+                </a:solidFill>
+              </a:rPr>
+              <a:t>Scala is your friend</a:t>
+            </a:r>
+          </a:p>
+        </p:txBody>
+      </p:sp>
+    </p:spTree>
+    <p:extLst>
+      <p:ext uri="{BB962C8B-B14F-4D97-AF65-F5344CB8AC3E}">
+        <p14:creationId xmlns:p14="http://schemas.microsoft.com/office/powerpoint/2010/main" val="4198274045"/>
+      </p:ext>
+    </p:extLst>
+  </p:cSld>
+  <p:clrMapOvr>
+    <a:masterClrMapping/>
+  </p:clrMapOvr>
+</p:sld>
+</file>
+
+<file path=ppt/slides/slide13.xml><?xml version="1.0" encoding="utf-8"?>
+<p:sld xmlns:a="http://schemas.openxmlformats.org/drawingml/2006/main" xmlns:r="http://schemas.openxmlformats.org/officeDocument/2006/relationships" xmlns:p="http://schemas.openxmlformats.org/presentationml/2006/main">
+  <p:cSld>
+    <p:spTree>
+      <p:nvGrpSpPr>
+        <p:cNvPr id="1" name=""/>
+        <p:cNvGrpSpPr/>
+        <p:nvPr/>
+      </p:nvGrpSpPr>
+      <p:grpSpPr>
+        <a:xfrm>
+          <a:off x="0" y="0"/>
+          <a:ext cx="0" cy="0"/>
+          <a:chOff x="0" y="0"/>
+          <a:chExt cx="0" cy="0"/>
+        </a:xfrm>
+      </p:grpSpPr>
+      <p:sp>
+        <p:nvSpPr>
+          <p:cNvPr id="2" name="Title 1">
+            <a:extLst>
+              <a:ext uri="{FF2B5EF4-FFF2-40B4-BE49-F238E27FC236}">
+                <a16:creationId xmlns:a16="http://schemas.microsoft.com/office/drawing/2014/main" xmlns="" id="{00846977-A750-4BB6-9AE6-AEB2DC7066DF}"/>
+              </a:ext>
+            </a:extLst>
+          </p:cNvPr>
+          <p:cNvSpPr>
+            <a:spLocks noGrp="1"/>
+          </p:cNvSpPr>
+          <p:nvPr>
+            <p:ph type="title"/>
+          </p:nvPr>
+        </p:nvSpPr>
+        <p:spPr>
+          <a:xfrm>
+            <a:off x="684212" y="703874"/>
+            <a:ext cx="8534400" cy="1507067"/>
+          </a:xfrm>
+        </p:spPr>
+        <p:txBody>
+          <a:bodyPr/>
+          <a:lstStyle/>
+          <a:p>
+            <a:r>
+              <a:rPr lang="en-US" dirty="0"/>
+              <a:t>Obstacles</a:t>
+            </a:r>
+          </a:p>
+        </p:txBody>
+      </p:sp>
+      <p:sp>
+        <p:nvSpPr>
+          <p:cNvPr id="3" name="Content Placeholder 2">
+            <a:extLst>
+              <a:ext uri="{FF2B5EF4-FFF2-40B4-BE49-F238E27FC236}">
+                <a16:creationId xmlns:a16="http://schemas.microsoft.com/office/drawing/2014/main" xmlns="" id="{F97BA237-BBF0-49FD-B184-71910E0D1F83}"/>
+              </a:ext>
+            </a:extLst>
+          </p:cNvPr>
+          <p:cNvSpPr>
+            <a:spLocks noGrp="1"/>
+          </p:cNvSpPr>
+          <p:nvPr>
+            <p:ph idx="1"/>
+          </p:nvPr>
+        </p:nvSpPr>
+        <p:spPr>
+          <a:xfrm>
+            <a:off x="684212" y="2393878"/>
+            <a:ext cx="8534400" cy="2482541"/>
+          </a:xfrm>
+        </p:spPr>
+        <p:txBody>
+          <a:bodyPr anchor="t">
+            <a:normAutofit/>
+          </a:bodyPr>
+          <a:lstStyle/>
+          <a:p>
+            <a:pPr marL="457200" indent="-457200">
+              <a:buClrTx/>
+              <a:buFont typeface="+mj-lt"/>
+              <a:buAutoNum type="arabicPeriod"/>
+            </a:pPr>
+            <a:r>
+              <a:rPr lang="en-US" sz="2400" dirty="0">
+                <a:solidFill>
+                  <a:schemeClr val="bg1"/>
+                </a:solidFill>
+              </a:rPr>
+              <a:t>Filling NULL values</a:t>
+            </a:r>
+          </a:p>
+          <a:p>
+            <a:pPr marL="457200" indent="-457200">
+              <a:buClrTx/>
+              <a:buFont typeface="+mj-lt"/>
+              <a:buAutoNum type="arabicPeriod"/>
+            </a:pPr>
+            <a:r>
+              <a:rPr lang="en-US" sz="2400" dirty="0">
+                <a:solidFill>
+                  <a:schemeClr val="bg1"/>
+                </a:solidFill>
+              </a:rPr>
+              <a:t>Regular Expressions</a:t>
+            </a:r>
+          </a:p>
+          <a:p>
+            <a:pPr marL="457200" indent="-457200">
+              <a:buClrTx/>
+              <a:buFont typeface="+mj-lt"/>
+              <a:buAutoNum type="arabicPeriod"/>
+            </a:pPr>
+            <a:r>
+              <a:rPr lang="en-US" sz="2400" dirty="0">
+                <a:solidFill>
+                  <a:schemeClr val="bg1"/>
+                </a:solidFill>
+              </a:rPr>
+              <a:t>TBD</a:t>
+            </a:r>
+          </a:p>
+        </p:txBody>
+      </p:sp>
+    </p:spTree>
+    <p:extLst>
+      <p:ext uri="{BB962C8B-B14F-4D97-AF65-F5344CB8AC3E}">
+        <p14:creationId xmlns:p14="http://schemas.microsoft.com/office/powerpoint/2010/main" val="3205346752"/>
+      </p:ext>
+    </p:extLst>
+  </p:cSld>
+  <p:clrMapOvr>
+    <a:masterClrMapping/>
+  </p:clrMapOvr>
+</p:sld>
+</file>
+
+<file path=ppt/slides/slide14.xml><?xml version="1.0" encoding="utf-8"?>
+<p:sld xmlns:a="http://schemas.openxmlformats.org/drawingml/2006/main" xmlns:r="http://schemas.openxmlformats.org/officeDocument/2006/relationships" xmlns:p="http://schemas.openxmlformats.org/presentationml/2006/main">
+  <p:cSld>
+    <p:spTree>
+      <p:nvGrpSpPr>
+        <p:cNvPr id="1" name=""/>
+        <p:cNvGrpSpPr/>
+        <p:nvPr/>
+      </p:nvGrpSpPr>
+      <p:grpSpPr>
+        <a:xfrm>
+          <a:off x="0" y="0"/>
+          <a:ext cx="0" cy="0"/>
+          <a:chOff x="0" y="0"/>
+          <a:chExt cx="0" cy="0"/>
+        </a:xfrm>
+      </p:grpSpPr>
+      <p:sp>
+        <p:nvSpPr>
+          <p:cNvPr id="2" name="Title 1">
+            <a:extLst>
+              <a:ext uri="{FF2B5EF4-FFF2-40B4-BE49-F238E27FC236}">
+                <a16:creationId xmlns:a16="http://schemas.microsoft.com/office/drawing/2014/main" xmlns="" id="{015E36F3-CFD3-4F0B-ACE1-6FFBBC14C8FE}"/>
               </a:ext>
             </a:extLst>
           </p:cNvPr>
@@ -5691,7 +6378,7 @@
           <p:cNvPr id="2" name="Title 1">
             <a:extLst>
               <a:ext uri="{FF2B5EF4-FFF2-40B4-BE49-F238E27FC236}">
-                <a16:creationId xmlns:a16="http://schemas.microsoft.com/office/drawing/2014/main" id="{895FA19E-1932-47E0-89E7-AC9D327BB2E1}"/>
+                <a16:creationId xmlns:a16="http://schemas.microsoft.com/office/drawing/2014/main" xmlns="" id="{895FA19E-1932-47E0-89E7-AC9D327BB2E1}"/>
               </a:ext>
             </a:extLst>
           </p:cNvPr>
@@ -5721,7 +6408,7 @@
           <p:cNvPr id="3" name="Text Placeholder 2">
             <a:extLst>
               <a:ext uri="{FF2B5EF4-FFF2-40B4-BE49-F238E27FC236}">
-                <a16:creationId xmlns:a16="http://schemas.microsoft.com/office/drawing/2014/main" id="{DF43FF17-42E6-44CD-AA0B-C1EA53436868}"/>
+                <a16:creationId xmlns:a16="http://schemas.microsoft.com/office/drawing/2014/main" xmlns="" id="{DF43FF17-42E6-44CD-AA0B-C1EA53436868}"/>
               </a:ext>
             </a:extLst>
           </p:cNvPr>
@@ -5811,7 +6498,7 @@
           <p:cNvPr id="2" name="Title 1">
             <a:extLst>
               <a:ext uri="{FF2B5EF4-FFF2-40B4-BE49-F238E27FC236}">
-                <a16:creationId xmlns:a16="http://schemas.microsoft.com/office/drawing/2014/main" id="{00846977-A750-4BB6-9AE6-AEB2DC7066DF}"/>
+                <a16:creationId xmlns:a16="http://schemas.microsoft.com/office/drawing/2014/main" xmlns="" id="{00846977-A750-4BB6-9AE6-AEB2DC7066DF}"/>
               </a:ext>
             </a:extLst>
           </p:cNvPr>
@@ -5844,7 +6531,7 @@
           <p:cNvPr id="3" name="Content Placeholder 2">
             <a:extLst>
               <a:ext uri="{FF2B5EF4-FFF2-40B4-BE49-F238E27FC236}">
-                <a16:creationId xmlns:a16="http://schemas.microsoft.com/office/drawing/2014/main" id="{F97BA237-BBF0-49FD-B184-71910E0D1F83}"/>
+                <a16:creationId xmlns:a16="http://schemas.microsoft.com/office/drawing/2014/main" xmlns="" id="{F97BA237-BBF0-49FD-B184-71910E0D1F83}"/>
               </a:ext>
             </a:extLst>
           </p:cNvPr>
@@ -5878,8 +6565,21 @@
                   <a:schemeClr val="bg1"/>
                 </a:solidFill>
               </a:rPr>
-              <a:t>Severity &amp; Roadway Type</a:t>
-            </a:r>
+              <a:t>Severity &amp; Roadway </a:t>
+            </a:r>
+            <a:r>
+              <a:rPr lang="en-US" sz="2400" dirty="0" smtClean="0">
+                <a:solidFill>
+                  <a:schemeClr val="bg1"/>
+                </a:solidFill>
+              </a:rPr>
+              <a:t>Type in top 5 states with the highest rate of accidents</a:t>
+            </a:r>
+            <a:endParaRPr lang="en-US" sz="2400" dirty="0">
+              <a:solidFill>
+                <a:schemeClr val="bg1"/>
+              </a:solidFill>
+            </a:endParaRPr>
           </a:p>
           <a:p>
             <a:pPr marL="457200" indent="-457200">
@@ -5963,7 +6663,7 @@
           <p:cNvPr id="2" name="Title 1">
             <a:extLst>
               <a:ext uri="{FF2B5EF4-FFF2-40B4-BE49-F238E27FC236}">
-                <a16:creationId xmlns:a16="http://schemas.microsoft.com/office/drawing/2014/main" id="{00846977-A750-4BB6-9AE6-AEB2DC7066DF}"/>
+                <a16:creationId xmlns:a16="http://schemas.microsoft.com/office/drawing/2014/main" xmlns="" id="{00846977-A750-4BB6-9AE6-AEB2DC7066DF}"/>
               </a:ext>
             </a:extLst>
           </p:cNvPr>
@@ -5996,7 +6696,7 @@
           <p:cNvPr id="3" name="Content Placeholder 2">
             <a:extLst>
               <a:ext uri="{FF2B5EF4-FFF2-40B4-BE49-F238E27FC236}">
-                <a16:creationId xmlns:a16="http://schemas.microsoft.com/office/drawing/2014/main" id="{F97BA237-BBF0-49FD-B184-71910E0D1F83}"/>
+                <a16:creationId xmlns:a16="http://schemas.microsoft.com/office/drawing/2014/main" xmlns="" id="{F97BA237-BBF0-49FD-B184-71910E0D1F83}"/>
               </a:ext>
             </a:extLst>
           </p:cNvPr>
@@ -6009,26 +6709,36 @@
         </p:nvSpPr>
         <p:spPr>
           <a:xfrm>
-            <a:off x="684212" y="2393878"/>
+            <a:off x="684212" y="1881259"/>
             <a:ext cx="8534400" cy="2482541"/>
           </a:xfrm>
         </p:spPr>
         <p:txBody>
-          <a:bodyPr>
+          <a:bodyPr anchor="t">
             <a:normAutofit/>
           </a:bodyPr>
           <a:lstStyle/>
           <a:p>
-            <a:pPr marL="457200" indent="-457200">
+            <a:pPr marL="0" indent="0" defTabSz="914400">
+              <a:spcBef>
+                <a:spcPts val="0"/>
+              </a:spcBef>
+              <a:spcAft>
+                <a:spcPts val="0"/>
+              </a:spcAft>
               <a:buClrTx/>
+              <a:buSzTx/>
               <a:buFont typeface="+mj-lt"/>
-              <a:buAutoNum type="arabicPeriod"/>
+              <a:buNone/>
             </a:pPr>
-            <a:endParaRPr lang="en-US" sz="2400" dirty="0">
-              <a:solidFill>
-                <a:schemeClr val="bg1"/>
-              </a:solidFill>
-            </a:endParaRPr>
+            <a:r>
+              <a:rPr lang="en-US" sz="2400" dirty="0" smtClean="0">
+                <a:solidFill>
+                  <a:schemeClr val="bg1"/>
+                </a:solidFill>
+              </a:rPr>
+              <a:t>Which 5 states have the highest rate of car accidents? For each of the 5 states, on which road types did most accidents occur and is there a correlation between the road type and severity of the accident?</a:t>
+            </a:r>
           </a:p>
         </p:txBody>
       </p:sp>
@@ -6067,7 +6777,7 @@
           <p:cNvPr id="2" name="Title 1">
             <a:extLst>
               <a:ext uri="{FF2B5EF4-FFF2-40B4-BE49-F238E27FC236}">
-                <a16:creationId xmlns:a16="http://schemas.microsoft.com/office/drawing/2014/main" id="{00846977-A750-4BB6-9AE6-AEB2DC7066DF}"/>
+                <a16:creationId xmlns:a16="http://schemas.microsoft.com/office/drawing/2014/main" xmlns="" id="{00846977-A750-4BB6-9AE6-AEB2DC7066DF}"/>
               </a:ext>
             </a:extLst>
           </p:cNvPr>
@@ -6089,9 +6799,10 @@
           <a:lstStyle/>
           <a:p>
             <a:r>
-              <a:rPr lang="en-US" dirty="0"/>
-              <a:t>Q2</a:t>
-            </a:r>
+              <a:rPr lang="en-US" dirty="0" smtClean="0"/>
+              <a:t>Q1 (cont.)</a:t>
+            </a:r>
+            <a:endParaRPr lang="en-US" dirty="0"/>
           </a:p>
         </p:txBody>
       </p:sp>
@@ -6100,7 +6811,1040 @@
           <p:cNvPr id="3" name="Content Placeholder 2">
             <a:extLst>
               <a:ext uri="{FF2B5EF4-FFF2-40B4-BE49-F238E27FC236}">
-                <a16:creationId xmlns:a16="http://schemas.microsoft.com/office/drawing/2014/main" id="{F97BA237-BBF0-49FD-B184-71910E0D1F83}"/>
+                <a16:creationId xmlns:a16="http://schemas.microsoft.com/office/drawing/2014/main" xmlns="" id="{F97BA237-BBF0-49FD-B184-71910E0D1F83}"/>
+              </a:ext>
+            </a:extLst>
+          </p:cNvPr>
+          <p:cNvSpPr>
+            <a:spLocks noGrp="1"/>
+          </p:cNvSpPr>
+          <p:nvPr>
+            <p:ph idx="1"/>
+          </p:nvPr>
+        </p:nvSpPr>
+        <p:spPr>
+          <a:xfrm>
+            <a:off x="684211" y="1881259"/>
+            <a:ext cx="11216843" cy="3785250"/>
+          </a:xfrm>
+        </p:spPr>
+        <p:txBody>
+          <a:bodyPr anchor="t">
+            <a:normAutofit lnSpcReduction="10000"/>
+          </a:bodyPr>
+          <a:lstStyle/>
+          <a:p>
+            <a:pPr marL="0" indent="0" defTabSz="914400">
+              <a:lnSpc>
+                <a:spcPct val="150000"/>
+              </a:lnSpc>
+              <a:spcBef>
+                <a:spcPts val="0"/>
+              </a:spcBef>
+              <a:spcAft>
+                <a:spcPts val="0"/>
+              </a:spcAft>
+              <a:buClrTx/>
+              <a:buSzTx/>
+              <a:buFont typeface="+mj-lt"/>
+              <a:buNone/>
+            </a:pPr>
+            <a:r>
+              <a:rPr lang="en-US" sz="2400" dirty="0" smtClean="0">
+                <a:solidFill>
+                  <a:schemeClr val="bg1"/>
+                </a:solidFill>
+              </a:rPr>
+              <a:t>Method:</a:t>
+            </a:r>
+          </a:p>
+          <a:p>
+            <a:pPr marL="0" indent="-457200" defTabSz="914400">
+              <a:lnSpc>
+                <a:spcPct val="150000"/>
+              </a:lnSpc>
+              <a:spcBef>
+                <a:spcPts val="0"/>
+              </a:spcBef>
+              <a:spcAft>
+                <a:spcPts val="0"/>
+              </a:spcAft>
+              <a:buClrTx/>
+              <a:buSzTx/>
+              <a:buFont typeface="Arial" charset="0"/>
+              <a:buChar char="•"/>
+            </a:pPr>
+            <a:r>
+              <a:rPr lang="en-US" sz="2400" dirty="0" smtClean="0">
+                <a:solidFill>
+                  <a:schemeClr val="bg1"/>
+                </a:solidFill>
+              </a:rPr>
+              <a:t>2 RDDs:</a:t>
+            </a:r>
+            <a:r>
+              <a:rPr lang="en-US" sz="2400" dirty="0" smtClean="0">
+                <a:solidFill>
+                  <a:schemeClr val="bg1"/>
+                </a:solidFill>
+              </a:rPr>
+              <a:t/>
+            </a:r>
+            <a:br>
+              <a:rPr lang="en-US" sz="2400" dirty="0" smtClean="0">
+                <a:solidFill>
+                  <a:schemeClr val="bg1"/>
+                </a:solidFill>
+              </a:rPr>
+            </a:br>
+            <a:r>
+              <a:rPr lang="en-US" sz="2400" dirty="0" smtClean="0">
+                <a:solidFill>
+                  <a:schemeClr val="bg1"/>
+                </a:solidFill>
+              </a:rPr>
+              <a:t>	</a:t>
+            </a:r>
+            <a:r>
+              <a:rPr lang="en-US" sz="2400" dirty="0" smtClean="0">
+                <a:solidFill>
+                  <a:schemeClr val="bg1"/>
+                </a:solidFill>
+              </a:rPr>
+              <a:t>Map(state, # of accidents)</a:t>
+            </a:r>
+            <a:br>
+              <a:rPr lang="en-US" sz="2400" dirty="0" smtClean="0">
+                <a:solidFill>
+                  <a:schemeClr val="bg1"/>
+                </a:solidFill>
+              </a:rPr>
+            </a:br>
+            <a:r>
+              <a:rPr lang="en-US" sz="2400" dirty="0" smtClean="0">
+                <a:solidFill>
+                  <a:schemeClr val="bg1"/>
+                </a:solidFill>
+              </a:rPr>
+              <a:t>	Map(state, </a:t>
+            </a:r>
+            <a:r>
+              <a:rPr lang="en-US" sz="2400" dirty="0" err="1" smtClean="0">
+                <a:solidFill>
+                  <a:schemeClr val="bg1"/>
+                </a:solidFill>
+              </a:rPr>
+              <a:t>SortedList</a:t>
+            </a:r>
+            <a:r>
+              <a:rPr lang="en-US" sz="2400" dirty="0" smtClean="0">
+                <a:solidFill>
+                  <a:schemeClr val="bg1"/>
+                </a:solidFill>
+              </a:rPr>
+              <a:t>(</a:t>
+            </a:r>
+            <a:r>
+              <a:rPr lang="en-US" sz="2400" dirty="0" err="1" smtClean="0">
+                <a:solidFill>
+                  <a:schemeClr val="bg1"/>
+                </a:solidFill>
+              </a:rPr>
+              <a:t>roadtype</a:t>
+            </a:r>
+            <a:r>
+              <a:rPr lang="en-US" sz="2400" dirty="0" smtClean="0">
+                <a:solidFill>
+                  <a:schemeClr val="bg1"/>
+                </a:solidFill>
+              </a:rPr>
+              <a:t>, # of accidents, </a:t>
+            </a:r>
+            <a:r>
+              <a:rPr lang="en-US" sz="2400" dirty="0" err="1" smtClean="0">
+                <a:solidFill>
+                  <a:schemeClr val="bg1"/>
+                </a:solidFill>
+              </a:rPr>
+              <a:t>avg</a:t>
+            </a:r>
+            <a:r>
+              <a:rPr lang="en-US" sz="2400" dirty="0" smtClean="0">
+                <a:solidFill>
+                  <a:schemeClr val="bg1"/>
+                </a:solidFill>
+              </a:rPr>
+              <a:t> severity))</a:t>
+            </a:r>
+          </a:p>
+          <a:p>
+            <a:pPr marL="0" indent="-457200" defTabSz="914400">
+              <a:lnSpc>
+                <a:spcPct val="150000"/>
+              </a:lnSpc>
+              <a:spcBef>
+                <a:spcPts val="0"/>
+              </a:spcBef>
+              <a:spcAft>
+                <a:spcPts val="0"/>
+              </a:spcAft>
+              <a:buClrTx/>
+              <a:buSzTx/>
+              <a:buFont typeface="Arial" charset="0"/>
+              <a:buChar char="•"/>
+            </a:pPr>
+            <a:r>
+              <a:rPr lang="en-US" sz="2400" dirty="0" smtClean="0">
+                <a:solidFill>
+                  <a:schemeClr val="bg1"/>
+                </a:solidFill>
+              </a:rPr>
+              <a:t>Road types were extracted using regular expressions</a:t>
+            </a:r>
+          </a:p>
+          <a:p>
+            <a:pPr marL="914400" lvl="2" indent="-457200" defTabSz="914400">
+              <a:lnSpc>
+                <a:spcPct val="150000"/>
+              </a:lnSpc>
+              <a:spcBef>
+                <a:spcPts val="0"/>
+              </a:spcBef>
+              <a:spcAft>
+                <a:spcPts val="0"/>
+              </a:spcAft>
+              <a:buClrTx/>
+              <a:buSzTx/>
+              <a:buFont typeface="Arial" charset="0"/>
+              <a:buChar char="•"/>
+            </a:pPr>
+            <a:r>
+              <a:rPr lang="en-US" sz="2400" dirty="0" smtClean="0">
+                <a:solidFill>
+                  <a:schemeClr val="bg1"/>
+                </a:solidFill>
+              </a:rPr>
+              <a:t>“I-5 W” contains “I-{number} {bound}”</a:t>
+            </a:r>
+          </a:p>
+          <a:p>
+            <a:pPr marL="914400" lvl="2" indent="-457200" defTabSz="914400">
+              <a:lnSpc>
+                <a:spcPct val="150000"/>
+              </a:lnSpc>
+              <a:spcBef>
+                <a:spcPts val="0"/>
+              </a:spcBef>
+              <a:spcAft>
+                <a:spcPts val="0"/>
+              </a:spcAft>
+              <a:buClrTx/>
+              <a:buSzTx/>
+              <a:buFont typeface="Arial" charset="0"/>
+              <a:buChar char="•"/>
+            </a:pPr>
+            <a:r>
+              <a:rPr lang="en-US" sz="2400" dirty="0" smtClean="0">
+                <a:solidFill>
+                  <a:schemeClr val="bg1"/>
+                </a:solidFill>
+              </a:rPr>
+              <a:t>“CA-1 S” contains ”{2 char </a:t>
+            </a:r>
+            <a:r>
+              <a:rPr lang="en-US" sz="2400" dirty="0" err="1" smtClean="0">
+                <a:solidFill>
+                  <a:schemeClr val="bg1"/>
+                </a:solidFill>
+              </a:rPr>
+              <a:t>abbv</a:t>
+            </a:r>
+            <a:r>
+              <a:rPr lang="en-US" sz="2400" dirty="0" smtClean="0">
+                <a:solidFill>
+                  <a:schemeClr val="bg1"/>
+                </a:solidFill>
+              </a:rPr>
+              <a:t> for state}-{number} {bound}”</a:t>
+            </a:r>
+          </a:p>
+        </p:txBody>
+      </p:sp>
+    </p:spTree>
+    <p:extLst>
+      <p:ext uri="{BB962C8B-B14F-4D97-AF65-F5344CB8AC3E}">
+        <p14:creationId xmlns:p14="http://schemas.microsoft.com/office/powerpoint/2010/main" val="1258063272"/>
+      </p:ext>
+    </p:extLst>
+  </p:cSld>
+  <p:clrMapOvr>
+    <a:masterClrMapping/>
+  </p:clrMapOvr>
+</p:sld>
+</file>
+
+<file path=ppt/slides/slide6.xml><?xml version="1.0" encoding="utf-8"?>
+<p:sld xmlns:a="http://schemas.openxmlformats.org/drawingml/2006/main" xmlns:r="http://schemas.openxmlformats.org/officeDocument/2006/relationships" xmlns:p="http://schemas.openxmlformats.org/presentationml/2006/main">
+  <p:cSld>
+    <p:spTree>
+      <p:nvGrpSpPr>
+        <p:cNvPr id="1" name=""/>
+        <p:cNvGrpSpPr/>
+        <p:nvPr/>
+      </p:nvGrpSpPr>
+      <p:grpSpPr>
+        <a:xfrm>
+          <a:off x="0" y="0"/>
+          <a:ext cx="0" cy="0"/>
+          <a:chOff x="0" y="0"/>
+          <a:chExt cx="0" cy="0"/>
+        </a:xfrm>
+      </p:grpSpPr>
+      <p:sp>
+        <p:nvSpPr>
+          <p:cNvPr id="2" name="Title 1">
+            <a:extLst>
+              <a:ext uri="{FF2B5EF4-FFF2-40B4-BE49-F238E27FC236}">
+                <a16:creationId xmlns:a16="http://schemas.microsoft.com/office/drawing/2014/main" xmlns="" id="{00846977-A750-4BB6-9AE6-AEB2DC7066DF}"/>
+              </a:ext>
+            </a:extLst>
+          </p:cNvPr>
+          <p:cNvSpPr>
+            <a:spLocks noGrp="1"/>
+          </p:cNvSpPr>
+          <p:nvPr>
+            <p:ph type="title"/>
+          </p:nvPr>
+        </p:nvSpPr>
+        <p:spPr>
+          <a:xfrm>
+            <a:off x="684212" y="703874"/>
+            <a:ext cx="8534400" cy="1507067"/>
+          </a:xfrm>
+        </p:spPr>
+        <p:txBody>
+          <a:bodyPr/>
+          <a:lstStyle/>
+          <a:p>
+            <a:r>
+              <a:rPr lang="en-US" dirty="0" smtClean="0"/>
+              <a:t>Q1 (cont.)</a:t>
+            </a:r>
+            <a:endParaRPr lang="en-US" dirty="0"/>
+          </a:p>
+        </p:txBody>
+      </p:sp>
+      <p:sp>
+        <p:nvSpPr>
+          <p:cNvPr id="3" name="Content Placeholder 2">
+            <a:extLst>
+              <a:ext uri="{FF2B5EF4-FFF2-40B4-BE49-F238E27FC236}">
+                <a16:creationId xmlns:a16="http://schemas.microsoft.com/office/drawing/2014/main" xmlns="" id="{F97BA237-BBF0-49FD-B184-71910E0D1F83}"/>
+              </a:ext>
+            </a:extLst>
+          </p:cNvPr>
+          <p:cNvSpPr>
+            <a:spLocks noGrp="1"/>
+          </p:cNvSpPr>
+          <p:nvPr>
+            <p:ph idx="1"/>
+          </p:nvPr>
+        </p:nvSpPr>
+        <p:spPr>
+          <a:xfrm>
+            <a:off x="684211" y="1881259"/>
+            <a:ext cx="11216843" cy="3785250"/>
+          </a:xfrm>
+        </p:spPr>
+        <p:txBody>
+          <a:bodyPr anchor="t">
+            <a:normAutofit lnSpcReduction="10000"/>
+          </a:bodyPr>
+          <a:lstStyle/>
+          <a:p>
+            <a:pPr marL="0" indent="0" defTabSz="914400">
+              <a:spcBef>
+                <a:spcPts val="0"/>
+              </a:spcBef>
+              <a:spcAft>
+                <a:spcPts val="0"/>
+              </a:spcAft>
+              <a:buClrTx/>
+              <a:buSzTx/>
+              <a:buFont typeface="+mj-lt"/>
+              <a:buNone/>
+            </a:pPr>
+            <a:r>
+              <a:rPr lang="en-US" sz="2400" dirty="0" smtClean="0">
+                <a:solidFill>
+                  <a:schemeClr val="bg1"/>
+                </a:solidFill>
+              </a:rPr>
+              <a:t>Results:</a:t>
+            </a:r>
+          </a:p>
+          <a:p>
+            <a:pPr defTabSz="914400">
+              <a:spcBef>
+                <a:spcPts val="0"/>
+              </a:spcBef>
+              <a:spcAft>
+                <a:spcPts val="0"/>
+              </a:spcAft>
+              <a:buClrTx/>
+              <a:buSzTx/>
+              <a:buFont typeface="Arial" charset="0"/>
+              <a:buChar char="•"/>
+            </a:pPr>
+            <a:r>
+              <a:rPr lang="en-US" sz="2400" dirty="0">
+                <a:solidFill>
+                  <a:schemeClr val="bg1"/>
+                </a:solidFill>
+              </a:rPr>
+              <a:t>CA </a:t>
+            </a:r>
+            <a:r>
+              <a:rPr lang="en-US" sz="2400" dirty="0" smtClean="0">
+                <a:solidFill>
+                  <a:schemeClr val="bg1"/>
+                </a:solidFill>
+              </a:rPr>
+              <a:t>9768</a:t>
+            </a:r>
+            <a:endParaRPr lang="en-US" sz="2400" dirty="0">
+              <a:solidFill>
+                <a:schemeClr val="bg1"/>
+              </a:solidFill>
+            </a:endParaRPr>
+          </a:p>
+          <a:p>
+            <a:pPr lvl="1" defTabSz="914400">
+              <a:spcBef>
+                <a:spcPts val="0"/>
+              </a:spcBef>
+              <a:spcAft>
+                <a:spcPts val="0"/>
+              </a:spcAft>
+              <a:buClrTx/>
+              <a:buSzTx/>
+              <a:buFont typeface="Arial" charset="0"/>
+              <a:buChar char="•"/>
+            </a:pPr>
+            <a:r>
+              <a:rPr lang="en-US" sz="1600" dirty="0" smtClean="0">
+                <a:solidFill>
+                  <a:schemeClr val="bg1"/>
+                </a:solidFill>
+              </a:rPr>
+              <a:t>(Local </a:t>
+            </a:r>
+            <a:r>
+              <a:rPr lang="en-US" sz="1600" dirty="0">
+                <a:solidFill>
+                  <a:schemeClr val="bg1"/>
+                </a:solidFill>
+              </a:rPr>
+              <a:t>Street, 4039, 2.23), (Interstate, 2352, 2.92), (Freeway, 1748, 2.58), (State Highway, 1388, 2.09), (Highway, 241, 2.08</a:t>
+            </a:r>
+            <a:r>
+              <a:rPr lang="en-US" sz="1600" dirty="0" smtClean="0">
+                <a:solidFill>
+                  <a:schemeClr val="bg1"/>
+                </a:solidFill>
+              </a:rPr>
+              <a:t>)</a:t>
+            </a:r>
+          </a:p>
+          <a:p>
+            <a:pPr defTabSz="914400">
+              <a:spcBef>
+                <a:spcPts val="0"/>
+              </a:spcBef>
+              <a:spcAft>
+                <a:spcPts val="0"/>
+              </a:spcAft>
+              <a:buClrTx/>
+              <a:buSzTx/>
+              <a:buFont typeface="Arial" charset="0"/>
+              <a:buChar char="•"/>
+            </a:pPr>
+            <a:r>
+              <a:rPr lang="en-US" sz="2400" dirty="0" smtClean="0">
+                <a:solidFill>
+                  <a:schemeClr val="bg1"/>
+                </a:solidFill>
+              </a:rPr>
+              <a:t>TX 4877</a:t>
+            </a:r>
+            <a:endParaRPr lang="en-US" sz="2400" dirty="0">
+              <a:solidFill>
+                <a:schemeClr val="bg1"/>
+              </a:solidFill>
+            </a:endParaRPr>
+          </a:p>
+          <a:p>
+            <a:pPr lvl="1" defTabSz="914400">
+              <a:spcBef>
+                <a:spcPts val="0"/>
+              </a:spcBef>
+              <a:spcAft>
+                <a:spcPts val="0"/>
+              </a:spcAft>
+              <a:buClrTx/>
+              <a:buSzTx/>
+              <a:buFont typeface="Arial" charset="0"/>
+              <a:buChar char="•"/>
+            </a:pPr>
+            <a:r>
+              <a:rPr lang="en-US" sz="1600" dirty="0" smtClean="0">
+                <a:solidFill>
+                  <a:schemeClr val="bg1"/>
+                </a:solidFill>
+              </a:rPr>
+              <a:t>(Local </a:t>
+            </a:r>
+            <a:r>
+              <a:rPr lang="en-US" sz="1600" dirty="0">
+                <a:solidFill>
+                  <a:schemeClr val="bg1"/>
+                </a:solidFill>
+              </a:rPr>
+              <a:t>Street, 3837, 2.13), (Interstate, 417, 2.87), (State Highway, 367, 2.43), (Freeway, 213, 2.56</a:t>
+            </a:r>
+            <a:r>
+              <a:rPr lang="en-US" sz="1600" dirty="0" smtClean="0">
+                <a:solidFill>
+                  <a:schemeClr val="bg1"/>
+                </a:solidFill>
+              </a:rPr>
+              <a:t>),</a:t>
+            </a:r>
+            <a:br>
+              <a:rPr lang="en-US" sz="1600" dirty="0" smtClean="0">
+                <a:solidFill>
+                  <a:schemeClr val="bg1"/>
+                </a:solidFill>
+              </a:rPr>
+            </a:br>
+            <a:r>
+              <a:rPr lang="en-US" sz="1600" dirty="0" smtClean="0">
+                <a:solidFill>
+                  <a:schemeClr val="bg1"/>
+                </a:solidFill>
+              </a:rPr>
+              <a:t>(</a:t>
+            </a:r>
+            <a:r>
+              <a:rPr lang="en-US" sz="1600" dirty="0">
+                <a:solidFill>
+                  <a:schemeClr val="bg1"/>
+                </a:solidFill>
+              </a:rPr>
+              <a:t>Highway, 43, 2.28</a:t>
+            </a:r>
+            <a:r>
+              <a:rPr lang="en-US" sz="1600" dirty="0" smtClean="0">
+                <a:solidFill>
+                  <a:schemeClr val="bg1"/>
+                </a:solidFill>
+              </a:rPr>
+              <a:t>)</a:t>
+            </a:r>
+          </a:p>
+          <a:p>
+            <a:pPr defTabSz="914400">
+              <a:spcBef>
+                <a:spcPts val="0"/>
+              </a:spcBef>
+              <a:spcAft>
+                <a:spcPts val="0"/>
+              </a:spcAft>
+              <a:buClrTx/>
+              <a:buSzTx/>
+              <a:buFont typeface="Arial" charset="0"/>
+              <a:buChar char="•"/>
+            </a:pPr>
+            <a:r>
+              <a:rPr lang="en-US" sz="2400" dirty="0" smtClean="0">
+                <a:solidFill>
+                  <a:schemeClr val="bg1"/>
+                </a:solidFill>
+              </a:rPr>
+              <a:t>FL 3034</a:t>
+            </a:r>
+            <a:endParaRPr lang="en-US" sz="2400" dirty="0">
+              <a:solidFill>
+                <a:schemeClr val="bg1"/>
+              </a:solidFill>
+            </a:endParaRPr>
+          </a:p>
+          <a:p>
+            <a:pPr lvl="1" defTabSz="914400">
+              <a:spcBef>
+                <a:spcPts val="0"/>
+              </a:spcBef>
+              <a:spcAft>
+                <a:spcPts val="0"/>
+              </a:spcAft>
+              <a:buClrTx/>
+              <a:buSzTx/>
+              <a:buFont typeface="Arial" charset="0"/>
+              <a:buChar char="•"/>
+            </a:pPr>
+            <a:r>
+              <a:rPr lang="en-US" sz="1600" dirty="0" smtClean="0">
+                <a:solidFill>
+                  <a:schemeClr val="bg1"/>
+                </a:solidFill>
+              </a:rPr>
+              <a:t>(Local </a:t>
+            </a:r>
+            <a:r>
+              <a:rPr lang="en-US" sz="1600" dirty="0">
+                <a:solidFill>
+                  <a:schemeClr val="bg1"/>
+                </a:solidFill>
+              </a:rPr>
+              <a:t>Street, 2329, 2.18), (Interstate, 619, 2.92), (Highway, 53, 2.15), (State Highway, 33, 2.39</a:t>
+            </a:r>
+            <a:r>
+              <a:rPr lang="en-US" sz="1600" dirty="0" smtClean="0">
+                <a:solidFill>
+                  <a:schemeClr val="bg1"/>
+                </a:solidFill>
+              </a:rPr>
+              <a:t>)</a:t>
+            </a:r>
+          </a:p>
+          <a:p>
+            <a:pPr defTabSz="914400">
+              <a:spcBef>
+                <a:spcPts val="0"/>
+              </a:spcBef>
+              <a:spcAft>
+                <a:spcPts val="0"/>
+              </a:spcAft>
+              <a:buClrTx/>
+              <a:buSzTx/>
+              <a:buFont typeface="Arial" charset="0"/>
+              <a:buChar char="•"/>
+            </a:pPr>
+            <a:r>
+              <a:rPr lang="en-US" sz="2400" dirty="0" smtClean="0">
+                <a:solidFill>
+                  <a:schemeClr val="bg1"/>
+                </a:solidFill>
+              </a:rPr>
+              <a:t>PA 1835</a:t>
+            </a:r>
+            <a:endParaRPr lang="en-US" sz="2400" dirty="0">
+              <a:solidFill>
+                <a:schemeClr val="bg1"/>
+              </a:solidFill>
+            </a:endParaRPr>
+          </a:p>
+          <a:p>
+            <a:pPr lvl="1" defTabSz="914400">
+              <a:spcBef>
+                <a:spcPts val="0"/>
+              </a:spcBef>
+              <a:spcAft>
+                <a:spcPts val="0"/>
+              </a:spcAft>
+              <a:buClrTx/>
+              <a:buSzTx/>
+              <a:buFont typeface="Arial" charset="0"/>
+              <a:buChar char="•"/>
+            </a:pPr>
+            <a:r>
+              <a:rPr lang="en-US" sz="1600" dirty="0" smtClean="0">
+                <a:solidFill>
+                  <a:schemeClr val="bg1"/>
+                </a:solidFill>
+              </a:rPr>
+              <a:t>(Local </a:t>
+            </a:r>
+            <a:r>
+              <a:rPr lang="en-US" sz="1600" dirty="0">
+                <a:solidFill>
+                  <a:schemeClr val="bg1"/>
+                </a:solidFill>
+              </a:rPr>
+              <a:t>Street, 1573, 2.08), (Interstate, 136, 2.86), (State Highway, 80, 2.31), (Highway, 46, 2.37</a:t>
+            </a:r>
+            <a:r>
+              <a:rPr lang="en-US" sz="1600" dirty="0" smtClean="0">
+                <a:solidFill>
+                  <a:schemeClr val="bg1"/>
+                </a:solidFill>
+              </a:rPr>
+              <a:t>)</a:t>
+            </a:r>
+          </a:p>
+          <a:p>
+            <a:pPr defTabSz="914400">
+              <a:spcBef>
+                <a:spcPts val="0"/>
+              </a:spcBef>
+              <a:spcAft>
+                <a:spcPts val="0"/>
+              </a:spcAft>
+              <a:buClrTx/>
+              <a:buSzTx/>
+              <a:buFont typeface="Arial" charset="0"/>
+              <a:buChar char="•"/>
+            </a:pPr>
+            <a:r>
+              <a:rPr lang="en-US" sz="2400" dirty="0" smtClean="0">
+                <a:solidFill>
+                  <a:schemeClr val="bg1"/>
+                </a:solidFill>
+              </a:rPr>
+              <a:t>NY 1732</a:t>
+            </a:r>
+            <a:endParaRPr lang="en-US" sz="2400" dirty="0">
+              <a:solidFill>
+                <a:schemeClr val="bg1"/>
+              </a:solidFill>
+            </a:endParaRPr>
+          </a:p>
+          <a:p>
+            <a:pPr lvl="1" defTabSz="914400">
+              <a:spcBef>
+                <a:spcPts val="0"/>
+              </a:spcBef>
+              <a:spcAft>
+                <a:spcPts val="0"/>
+              </a:spcAft>
+              <a:buClrTx/>
+              <a:buSzTx/>
+              <a:buFont typeface="Arial" charset="0"/>
+              <a:buChar char="•"/>
+            </a:pPr>
+            <a:r>
+              <a:rPr lang="en-US" sz="1600" dirty="0" smtClean="0">
+                <a:solidFill>
+                  <a:schemeClr val="bg1"/>
+                </a:solidFill>
+              </a:rPr>
+              <a:t>(Local </a:t>
+            </a:r>
+            <a:r>
+              <a:rPr lang="en-US" sz="1600" dirty="0">
+                <a:solidFill>
+                  <a:schemeClr val="bg1"/>
+                </a:solidFill>
+              </a:rPr>
+              <a:t>Street, 1448, 2.37), (Interstate, 253, 2.82), (State Highway, 16, 2.31), (Highway, 15, 2.13)</a:t>
+            </a:r>
+            <a:endParaRPr lang="en-US" sz="1600" dirty="0" smtClean="0">
+              <a:solidFill>
+                <a:schemeClr val="bg1"/>
+              </a:solidFill>
+            </a:endParaRPr>
+          </a:p>
+        </p:txBody>
+      </p:sp>
+    </p:spTree>
+    <p:extLst>
+      <p:ext uri="{BB962C8B-B14F-4D97-AF65-F5344CB8AC3E}">
+        <p14:creationId xmlns:p14="http://schemas.microsoft.com/office/powerpoint/2010/main" val="696298671"/>
+      </p:ext>
+    </p:extLst>
+  </p:cSld>
+  <p:clrMapOvr>
+    <a:masterClrMapping/>
+  </p:clrMapOvr>
+</p:sld>
+</file>
+
+<file path=ppt/slides/slide7.xml><?xml version="1.0" encoding="utf-8"?>
+<p:sld xmlns:a="http://schemas.openxmlformats.org/drawingml/2006/main" xmlns:r="http://schemas.openxmlformats.org/officeDocument/2006/relationships" xmlns:p="http://schemas.openxmlformats.org/presentationml/2006/main">
+  <p:cSld>
+    <p:spTree>
+      <p:nvGrpSpPr>
+        <p:cNvPr id="1" name=""/>
+        <p:cNvGrpSpPr/>
+        <p:nvPr/>
+      </p:nvGrpSpPr>
+      <p:grpSpPr>
+        <a:xfrm>
+          <a:off x="0" y="0"/>
+          <a:ext cx="0" cy="0"/>
+          <a:chOff x="0" y="0"/>
+          <a:chExt cx="0" cy="0"/>
+        </a:xfrm>
+      </p:grpSpPr>
+      <p:sp>
+        <p:nvSpPr>
+          <p:cNvPr id="2" name="Title 1">
+            <a:extLst>
+              <a:ext uri="{FF2B5EF4-FFF2-40B4-BE49-F238E27FC236}">
+                <a16:creationId xmlns:a16="http://schemas.microsoft.com/office/drawing/2014/main" xmlns="" id="{00846977-A750-4BB6-9AE6-AEB2DC7066DF}"/>
+              </a:ext>
+            </a:extLst>
+          </p:cNvPr>
+          <p:cNvSpPr>
+            <a:spLocks noGrp="1"/>
+          </p:cNvSpPr>
+          <p:nvPr>
+            <p:ph type="title"/>
+          </p:nvPr>
+        </p:nvSpPr>
+        <p:spPr>
+          <a:xfrm>
+            <a:off x="684212" y="703874"/>
+            <a:ext cx="8534400" cy="1507067"/>
+          </a:xfrm>
+        </p:spPr>
+        <p:txBody>
+          <a:bodyPr/>
+          <a:lstStyle/>
+          <a:p>
+            <a:r>
+              <a:rPr lang="en-US" dirty="0" smtClean="0"/>
+              <a:t>Q1 (cont.)</a:t>
+            </a:r>
+            <a:endParaRPr lang="en-US" dirty="0"/>
+          </a:p>
+        </p:txBody>
+      </p:sp>
+      <p:sp>
+        <p:nvSpPr>
+          <p:cNvPr id="3" name="Content Placeholder 2">
+            <a:extLst>
+              <a:ext uri="{FF2B5EF4-FFF2-40B4-BE49-F238E27FC236}">
+                <a16:creationId xmlns:a16="http://schemas.microsoft.com/office/drawing/2014/main" xmlns="" id="{F97BA237-BBF0-49FD-B184-71910E0D1F83}"/>
+              </a:ext>
+            </a:extLst>
+          </p:cNvPr>
+          <p:cNvSpPr>
+            <a:spLocks noGrp="1"/>
+          </p:cNvSpPr>
+          <p:nvPr>
+            <p:ph idx="1"/>
+          </p:nvPr>
+        </p:nvSpPr>
+        <p:spPr>
+          <a:xfrm>
+            <a:off x="684211" y="1881259"/>
+            <a:ext cx="11216843" cy="3785250"/>
+          </a:xfrm>
+        </p:spPr>
+        <p:txBody>
+          <a:bodyPr anchor="t">
+            <a:normAutofit/>
+          </a:bodyPr>
+          <a:lstStyle/>
+          <a:p>
+            <a:pPr marL="0" indent="0" defTabSz="914400">
+              <a:lnSpc>
+                <a:spcPct val="150000"/>
+              </a:lnSpc>
+              <a:spcBef>
+                <a:spcPts val="0"/>
+              </a:spcBef>
+              <a:spcAft>
+                <a:spcPts val="0"/>
+              </a:spcAft>
+              <a:buClrTx/>
+              <a:buSzTx/>
+              <a:buFont typeface="+mj-lt"/>
+              <a:buNone/>
+            </a:pPr>
+            <a:r>
+              <a:rPr lang="en-US" sz="2400" dirty="0" smtClean="0">
+                <a:solidFill>
+                  <a:schemeClr val="bg1"/>
+                </a:solidFill>
+              </a:rPr>
+              <a:t>Observations From Findings:</a:t>
+            </a:r>
+          </a:p>
+          <a:p>
+            <a:pPr defTabSz="914400">
+              <a:lnSpc>
+                <a:spcPct val="150000"/>
+              </a:lnSpc>
+              <a:spcBef>
+                <a:spcPts val="0"/>
+              </a:spcBef>
+              <a:spcAft>
+                <a:spcPts val="0"/>
+              </a:spcAft>
+              <a:buClrTx/>
+              <a:buSzTx/>
+              <a:buFont typeface="Arial" charset="0"/>
+              <a:buChar char="•"/>
+            </a:pPr>
+            <a:r>
+              <a:rPr lang="en-US" sz="2400" dirty="0" smtClean="0">
+                <a:solidFill>
+                  <a:schemeClr val="bg1"/>
+                </a:solidFill>
+              </a:rPr>
+              <a:t>California had the highest number of accidents in this sample</a:t>
+            </a:r>
+          </a:p>
+          <a:p>
+            <a:pPr defTabSz="914400">
+              <a:lnSpc>
+                <a:spcPct val="150000"/>
+              </a:lnSpc>
+              <a:spcBef>
+                <a:spcPts val="0"/>
+              </a:spcBef>
+              <a:spcAft>
+                <a:spcPts val="0"/>
+              </a:spcAft>
+              <a:buClrTx/>
+              <a:buSzTx/>
+              <a:buFont typeface="Arial" charset="0"/>
+              <a:buChar char="•"/>
+            </a:pPr>
+            <a:r>
+              <a:rPr lang="en-US" sz="2400" dirty="0" smtClean="0">
+                <a:solidFill>
+                  <a:schemeClr val="bg1"/>
+                </a:solidFill>
+              </a:rPr>
+              <a:t>For all 5 top states, the most accidents occurred on local streets (1</a:t>
+            </a:r>
+            <a:r>
+              <a:rPr lang="en-US" sz="2400" baseline="30000" dirty="0" smtClean="0">
+                <a:solidFill>
+                  <a:schemeClr val="bg1"/>
+                </a:solidFill>
+              </a:rPr>
+              <a:t>st</a:t>
+            </a:r>
+            <a:r>
+              <a:rPr lang="en-US" sz="2400" dirty="0" smtClean="0">
+                <a:solidFill>
+                  <a:schemeClr val="bg1"/>
+                </a:solidFill>
+              </a:rPr>
+              <a:t>) then on interstates (2</a:t>
+            </a:r>
+            <a:r>
+              <a:rPr lang="en-US" sz="2400" baseline="30000" dirty="0" smtClean="0">
+                <a:solidFill>
+                  <a:schemeClr val="bg1"/>
+                </a:solidFill>
+              </a:rPr>
+              <a:t>nd</a:t>
+            </a:r>
+            <a:r>
+              <a:rPr lang="en-US" sz="2400" dirty="0" smtClean="0">
+                <a:solidFill>
+                  <a:schemeClr val="bg1"/>
+                </a:solidFill>
+              </a:rPr>
+              <a:t>)</a:t>
+            </a:r>
+          </a:p>
+          <a:p>
+            <a:pPr defTabSz="914400">
+              <a:lnSpc>
+                <a:spcPct val="150000"/>
+              </a:lnSpc>
+              <a:spcBef>
+                <a:spcPts val="0"/>
+              </a:spcBef>
+              <a:spcAft>
+                <a:spcPts val="0"/>
+              </a:spcAft>
+              <a:buClrTx/>
+              <a:buSzTx/>
+              <a:buFont typeface="Arial" charset="0"/>
+              <a:buChar char="•"/>
+            </a:pPr>
+            <a:r>
+              <a:rPr lang="en-US" sz="2400" dirty="0" smtClean="0">
+                <a:solidFill>
+                  <a:schemeClr val="bg1"/>
+                </a:solidFill>
+              </a:rPr>
+              <a:t>For all 5 top states, the road with the highest average severity was the Interstates</a:t>
+            </a:r>
+            <a:endParaRPr lang="en-US" sz="2400" dirty="0" smtClean="0">
+              <a:solidFill>
+                <a:schemeClr val="bg1"/>
+              </a:solidFill>
+            </a:endParaRPr>
+          </a:p>
+        </p:txBody>
+      </p:sp>
+    </p:spTree>
+    <p:extLst>
+      <p:ext uri="{BB962C8B-B14F-4D97-AF65-F5344CB8AC3E}">
+        <p14:creationId xmlns:p14="http://schemas.microsoft.com/office/powerpoint/2010/main" val="1273846658"/>
+      </p:ext>
+    </p:extLst>
+  </p:cSld>
+  <p:clrMapOvr>
+    <a:masterClrMapping/>
+  </p:clrMapOvr>
+</p:sld>
+</file>
+
+<file path=ppt/slides/slide8.xml><?xml version="1.0" encoding="utf-8"?>
+<p:sld xmlns:a="http://schemas.openxmlformats.org/drawingml/2006/main" xmlns:r="http://schemas.openxmlformats.org/officeDocument/2006/relationships" xmlns:p="http://schemas.openxmlformats.org/presentationml/2006/main">
+  <p:cSld>
+    <p:spTree>
+      <p:nvGrpSpPr>
+        <p:cNvPr id="1" name=""/>
+        <p:cNvGrpSpPr/>
+        <p:nvPr/>
+      </p:nvGrpSpPr>
+      <p:grpSpPr>
+        <a:xfrm>
+          <a:off x="0" y="0"/>
+          <a:ext cx="0" cy="0"/>
+          <a:chOff x="0" y="0"/>
+          <a:chExt cx="0" cy="0"/>
+        </a:xfrm>
+      </p:grpSpPr>
+      <p:sp>
+        <p:nvSpPr>
+          <p:cNvPr id="2" name="Title 1">
+            <a:extLst>
+              <a:ext uri="{FF2B5EF4-FFF2-40B4-BE49-F238E27FC236}">
+                <a16:creationId xmlns:a16="http://schemas.microsoft.com/office/drawing/2014/main" xmlns="" id="{00846977-A750-4BB6-9AE6-AEB2DC7066DF}"/>
+              </a:ext>
+            </a:extLst>
+          </p:cNvPr>
+          <p:cNvSpPr>
+            <a:spLocks noGrp="1"/>
+          </p:cNvSpPr>
+          <p:nvPr>
+            <p:ph type="title"/>
+          </p:nvPr>
+        </p:nvSpPr>
+        <p:spPr>
+          <a:xfrm>
+            <a:off x="684212" y="703874"/>
+            <a:ext cx="8534400" cy="1507067"/>
+          </a:xfrm>
+        </p:spPr>
+        <p:txBody>
+          <a:bodyPr/>
+          <a:lstStyle/>
+          <a:p>
+            <a:r>
+              <a:rPr lang="en-US" dirty="0"/>
+              <a:t>Q2</a:t>
+            </a:r>
+          </a:p>
+        </p:txBody>
+      </p:sp>
+      <p:sp>
+        <p:nvSpPr>
+          <p:cNvPr id="3" name="Content Placeholder 2">
+            <a:extLst>
+              <a:ext uri="{FF2B5EF4-FFF2-40B4-BE49-F238E27FC236}">
+                <a16:creationId xmlns:a16="http://schemas.microsoft.com/office/drawing/2014/main" xmlns="" id="{F97BA237-BBF0-49FD-B184-71910E0D1F83}"/>
               </a:ext>
             </a:extLst>
           </p:cNvPr>
@@ -6168,7 +7912,7 @@
           <p:cNvPr id="5" name="Picture 4">
             <a:extLst>
               <a:ext uri="{FF2B5EF4-FFF2-40B4-BE49-F238E27FC236}">
-                <a16:creationId xmlns:a16="http://schemas.microsoft.com/office/drawing/2014/main" id="{200ECA3F-4939-4EF2-A1DB-C471CBA14D63}"/>
+                <a16:creationId xmlns:a16="http://schemas.microsoft.com/office/drawing/2014/main" xmlns="" id="{200ECA3F-4939-4EF2-A1DB-C471CBA14D63}"/>
               </a:ext>
             </a:extLst>
           </p:cNvPr>
@@ -6198,7 +7942,7 @@
           <p:cNvPr id="7" name="Picture 6">
             <a:extLst>
               <a:ext uri="{FF2B5EF4-FFF2-40B4-BE49-F238E27FC236}">
-                <a16:creationId xmlns:a16="http://schemas.microsoft.com/office/drawing/2014/main" id="{69E65273-4A91-4276-B9BF-98494B3A6E26}"/>
+                <a16:creationId xmlns:a16="http://schemas.microsoft.com/office/drawing/2014/main" xmlns="" id="{69E65273-4A91-4276-B9BF-98494B3A6E26}"/>
               </a:ext>
             </a:extLst>
           </p:cNvPr>
@@ -6236,7 +7980,7 @@
 </p:sld>
 </file>
 
-<file path=ppt/slides/slide6.xml><?xml version="1.0" encoding="utf-8"?>
+<file path=ppt/slides/slide9.xml><?xml version="1.0" encoding="utf-8"?>
 <p:sld xmlns:a="http://schemas.openxmlformats.org/drawingml/2006/main" xmlns:r="http://schemas.openxmlformats.org/officeDocument/2006/relationships" xmlns:p="http://schemas.openxmlformats.org/presentationml/2006/main">
   <p:cSld>
     <p:spTree>
@@ -6258,7 +8002,7 @@
           <p:cNvPr id="2" name="Title 1">
             <a:extLst>
               <a:ext uri="{FF2B5EF4-FFF2-40B4-BE49-F238E27FC236}">
-                <a16:creationId xmlns:a16="http://schemas.microsoft.com/office/drawing/2014/main" id="{00846977-A750-4BB6-9AE6-AEB2DC7066DF}"/>
+                <a16:creationId xmlns:a16="http://schemas.microsoft.com/office/drawing/2014/main" xmlns="" id="{00846977-A750-4BB6-9AE6-AEB2DC7066DF}"/>
               </a:ext>
             </a:extLst>
           </p:cNvPr>
@@ -6291,7 +8035,7 @@
           <p:cNvPr id="3" name="Content Placeholder 2">
             <a:extLst>
               <a:ext uri="{FF2B5EF4-FFF2-40B4-BE49-F238E27FC236}">
-                <a16:creationId xmlns:a16="http://schemas.microsoft.com/office/drawing/2014/main" id="{F97BA237-BBF0-49FD-B184-71910E0D1F83}"/>
+                <a16:creationId xmlns:a16="http://schemas.microsoft.com/office/drawing/2014/main" xmlns="" id="{F97BA237-BBF0-49FD-B184-71910E0D1F83}"/>
               </a:ext>
             </a:extLst>
           </p:cNvPr>
@@ -6359,7 +8103,7 @@
           <p:cNvPr id="4" name="Table 4">
             <a:extLst>
               <a:ext uri="{FF2B5EF4-FFF2-40B4-BE49-F238E27FC236}">
-                <a16:creationId xmlns:a16="http://schemas.microsoft.com/office/drawing/2014/main" id="{6510E398-7551-420B-8D02-F7C1BD41B844}"/>
+                <a16:creationId xmlns:a16="http://schemas.microsoft.com/office/drawing/2014/main" xmlns="" id="{6510E398-7551-420B-8D02-F7C1BD41B844}"/>
               </a:ext>
             </a:extLst>
           </p:cNvPr>
@@ -6388,21 +8132,21 @@
                 <a:gridCol w="2991519">
                   <a:extLst>
                     <a:ext uri="{9D8B030D-6E8A-4147-A177-3AD203B41FA5}">
-                      <a16:colId xmlns:a16="http://schemas.microsoft.com/office/drawing/2014/main" val="3801254530"/>
+                      <a16:colId xmlns:a16="http://schemas.microsoft.com/office/drawing/2014/main" xmlns="" val="3801254530"/>
                     </a:ext>
                   </a:extLst>
                 </a:gridCol>
                 <a:gridCol w="2991519">
                   <a:extLst>
                     <a:ext uri="{9D8B030D-6E8A-4147-A177-3AD203B41FA5}">
-                      <a16:colId xmlns:a16="http://schemas.microsoft.com/office/drawing/2014/main" val="1960992801"/>
+                      <a16:colId xmlns:a16="http://schemas.microsoft.com/office/drawing/2014/main" xmlns="" val="1960992801"/>
                     </a:ext>
                   </a:extLst>
                 </a:gridCol>
                 <a:gridCol w="2991519">
                   <a:extLst>
                     <a:ext uri="{9D8B030D-6E8A-4147-A177-3AD203B41FA5}">
-                      <a16:colId xmlns:a16="http://schemas.microsoft.com/office/drawing/2014/main" val="1444209519"/>
+                      <a16:colId xmlns:a16="http://schemas.microsoft.com/office/drawing/2014/main" xmlns="" val="1444209519"/>
                     </a:ext>
                   </a:extLst>
                 </a:gridCol>
@@ -6413,7 +8157,7 @@
                     <a:bodyPr/>
                     <a:lstStyle/>
                     <a:p>
-                      <a:endParaRPr lang="en-US"/>
+                      <a:endParaRPr lang="en-US" dirty="0"/>
                     </a:p>
                   </a:txBody>
                   <a:tcPr/>
@@ -6446,7 +8190,7 @@
                 </a:tc>
                 <a:extLst>
                   <a:ext uri="{0D108BD9-81ED-4DB2-BD59-A6C34878D82A}">
-                    <a16:rowId xmlns:a16="http://schemas.microsoft.com/office/drawing/2014/main" val="2260968950"/>
+                    <a16:rowId xmlns:a16="http://schemas.microsoft.com/office/drawing/2014/main" xmlns="" val="2260968950"/>
                   </a:ext>
                 </a:extLst>
               </a:tr>
@@ -6492,7 +8236,7 @@
                 </a:tc>
                 <a:extLst>
                   <a:ext uri="{0D108BD9-81ED-4DB2-BD59-A6C34878D82A}">
-                    <a16:rowId xmlns:a16="http://schemas.microsoft.com/office/drawing/2014/main" val="1182569935"/>
+                    <a16:rowId xmlns:a16="http://schemas.microsoft.com/office/drawing/2014/main" xmlns="" val="1182569935"/>
                   </a:ext>
                 </a:extLst>
               </a:tr>
@@ -6538,7 +8282,7 @@
                 </a:tc>
                 <a:extLst>
                   <a:ext uri="{0D108BD9-81ED-4DB2-BD59-A6C34878D82A}">
-                    <a16:rowId xmlns:a16="http://schemas.microsoft.com/office/drawing/2014/main" val="2275193028"/>
+                    <a16:rowId xmlns:a16="http://schemas.microsoft.com/office/drawing/2014/main" xmlns="" val="2275193028"/>
                   </a:ext>
                 </a:extLst>
               </a:tr>
@@ -6584,7 +8328,7 @@
                 </a:tc>
                 <a:extLst>
                   <a:ext uri="{0D108BD9-81ED-4DB2-BD59-A6C34878D82A}">
-                    <a16:rowId xmlns:a16="http://schemas.microsoft.com/office/drawing/2014/main" val="3267029629"/>
+                    <a16:rowId xmlns:a16="http://schemas.microsoft.com/office/drawing/2014/main" xmlns="" val="3267029629"/>
                   </a:ext>
                 </a:extLst>
               </a:tr>
@@ -6596,336 +8340,6 @@
     <p:extLst>
       <p:ext uri="{BB962C8B-B14F-4D97-AF65-F5344CB8AC3E}">
         <p14:creationId xmlns:p14="http://schemas.microsoft.com/office/powerpoint/2010/main" val="1358766687"/>
-      </p:ext>
-    </p:extLst>
-  </p:cSld>
-  <p:clrMapOvr>
-    <a:masterClrMapping/>
-  </p:clrMapOvr>
-</p:sld>
-</file>
-
-<file path=ppt/slides/slide7.xml><?xml version="1.0" encoding="utf-8"?>
-<p:sld xmlns:a="http://schemas.openxmlformats.org/drawingml/2006/main" xmlns:r="http://schemas.openxmlformats.org/officeDocument/2006/relationships" xmlns:p="http://schemas.openxmlformats.org/presentationml/2006/main">
-  <p:cSld>
-    <p:spTree>
-      <p:nvGrpSpPr>
-        <p:cNvPr id="1" name=""/>
-        <p:cNvGrpSpPr/>
-        <p:nvPr/>
-      </p:nvGrpSpPr>
-      <p:grpSpPr>
-        <a:xfrm>
-          <a:off x="0" y="0"/>
-          <a:ext cx="0" cy="0"/>
-          <a:chOff x="0" y="0"/>
-          <a:chExt cx="0" cy="0"/>
-        </a:xfrm>
-      </p:grpSpPr>
-      <p:sp>
-        <p:nvSpPr>
-          <p:cNvPr id="2" name="Title 1">
-            <a:extLst>
-              <a:ext uri="{FF2B5EF4-FFF2-40B4-BE49-F238E27FC236}">
-                <a16:creationId xmlns:a16="http://schemas.microsoft.com/office/drawing/2014/main" id="{00846977-A750-4BB6-9AE6-AEB2DC7066DF}"/>
-              </a:ext>
-            </a:extLst>
-          </p:cNvPr>
-          <p:cNvSpPr>
-            <a:spLocks noGrp="1"/>
-          </p:cNvSpPr>
-          <p:nvPr>
-            <p:ph type="title"/>
-          </p:nvPr>
-        </p:nvSpPr>
-        <p:spPr>
-          <a:xfrm>
-            <a:off x="684212" y="703874"/>
-            <a:ext cx="8534400" cy="1507067"/>
-          </a:xfrm>
-        </p:spPr>
-        <p:txBody>
-          <a:bodyPr/>
-          <a:lstStyle/>
-          <a:p>
-            <a:r>
-              <a:rPr lang="en-US" dirty="0"/>
-              <a:t>Q3</a:t>
-            </a:r>
-          </a:p>
-        </p:txBody>
-      </p:sp>
-      <p:sp>
-        <p:nvSpPr>
-          <p:cNvPr id="3" name="Content Placeholder 2">
-            <a:extLst>
-              <a:ext uri="{FF2B5EF4-FFF2-40B4-BE49-F238E27FC236}">
-                <a16:creationId xmlns:a16="http://schemas.microsoft.com/office/drawing/2014/main" id="{F97BA237-BBF0-49FD-B184-71910E0D1F83}"/>
-              </a:ext>
-            </a:extLst>
-          </p:cNvPr>
-          <p:cNvSpPr>
-            <a:spLocks noGrp="1"/>
-          </p:cNvSpPr>
-          <p:nvPr>
-            <p:ph idx="1"/>
-          </p:nvPr>
-        </p:nvSpPr>
-        <p:spPr>
-          <a:xfrm>
-            <a:off x="684212" y="2393878"/>
-            <a:ext cx="8534400" cy="2482541"/>
-          </a:xfrm>
-        </p:spPr>
-        <p:txBody>
-          <a:bodyPr>
-            <a:normAutofit/>
-          </a:bodyPr>
-          <a:lstStyle/>
-          <a:p>
-            <a:pPr marL="457200" indent="-457200">
-              <a:buClrTx/>
-              <a:buFont typeface="+mj-lt"/>
-              <a:buAutoNum type="arabicPeriod"/>
-            </a:pPr>
-            <a:endParaRPr lang="en-US" sz="2400" dirty="0">
-              <a:solidFill>
-                <a:schemeClr val="bg1"/>
-              </a:solidFill>
-            </a:endParaRPr>
-          </a:p>
-        </p:txBody>
-      </p:sp>
-    </p:spTree>
-    <p:extLst>
-      <p:ext uri="{BB962C8B-B14F-4D97-AF65-F5344CB8AC3E}">
-        <p14:creationId xmlns:p14="http://schemas.microsoft.com/office/powerpoint/2010/main" val="1280595349"/>
-      </p:ext>
-    </p:extLst>
-  </p:cSld>
-  <p:clrMapOvr>
-    <a:masterClrMapping/>
-  </p:clrMapOvr>
-</p:sld>
-</file>
-
-<file path=ppt/slides/slide8.xml><?xml version="1.0" encoding="utf-8"?>
-<p:sld xmlns:a="http://schemas.openxmlformats.org/drawingml/2006/main" xmlns:r="http://schemas.openxmlformats.org/officeDocument/2006/relationships" xmlns:p="http://schemas.openxmlformats.org/presentationml/2006/main">
-  <p:cSld>
-    <p:spTree>
-      <p:nvGrpSpPr>
-        <p:cNvPr id="1" name=""/>
-        <p:cNvGrpSpPr/>
-        <p:nvPr/>
-      </p:nvGrpSpPr>
-      <p:grpSpPr>
-        <a:xfrm>
-          <a:off x="0" y="0"/>
-          <a:ext cx="0" cy="0"/>
-          <a:chOff x="0" y="0"/>
-          <a:chExt cx="0" cy="0"/>
-        </a:xfrm>
-      </p:grpSpPr>
-      <p:sp>
-        <p:nvSpPr>
-          <p:cNvPr id="2" name="Title 1">
-            <a:extLst>
-              <a:ext uri="{FF2B5EF4-FFF2-40B4-BE49-F238E27FC236}">
-                <a16:creationId xmlns:a16="http://schemas.microsoft.com/office/drawing/2014/main" id="{00846977-A750-4BB6-9AE6-AEB2DC7066DF}"/>
-              </a:ext>
-            </a:extLst>
-          </p:cNvPr>
-          <p:cNvSpPr>
-            <a:spLocks noGrp="1"/>
-          </p:cNvSpPr>
-          <p:nvPr>
-            <p:ph type="title"/>
-          </p:nvPr>
-        </p:nvSpPr>
-        <p:spPr>
-          <a:xfrm>
-            <a:off x="684212" y="703874"/>
-            <a:ext cx="8534400" cy="1507067"/>
-          </a:xfrm>
-        </p:spPr>
-        <p:txBody>
-          <a:bodyPr/>
-          <a:lstStyle/>
-          <a:p>
-            <a:r>
-              <a:rPr lang="en-US" dirty="0"/>
-              <a:t>Q4</a:t>
-            </a:r>
-          </a:p>
-        </p:txBody>
-      </p:sp>
-      <p:sp>
-        <p:nvSpPr>
-          <p:cNvPr id="3" name="Content Placeholder 2">
-            <a:extLst>
-              <a:ext uri="{FF2B5EF4-FFF2-40B4-BE49-F238E27FC236}">
-                <a16:creationId xmlns:a16="http://schemas.microsoft.com/office/drawing/2014/main" id="{F97BA237-BBF0-49FD-B184-71910E0D1F83}"/>
-              </a:ext>
-            </a:extLst>
-          </p:cNvPr>
-          <p:cNvSpPr>
-            <a:spLocks noGrp="1"/>
-          </p:cNvSpPr>
-          <p:nvPr>
-            <p:ph idx="1"/>
-          </p:nvPr>
-        </p:nvSpPr>
-        <p:spPr>
-          <a:xfrm>
-            <a:off x="684212" y="2393878"/>
-            <a:ext cx="8534400" cy="2482541"/>
-          </a:xfrm>
-        </p:spPr>
-        <p:txBody>
-          <a:bodyPr>
-            <a:normAutofit/>
-          </a:bodyPr>
-          <a:lstStyle/>
-          <a:p>
-            <a:pPr marL="457200" indent="-457200">
-              <a:buClrTx/>
-              <a:buFont typeface="+mj-lt"/>
-              <a:buAutoNum type="arabicPeriod"/>
-            </a:pPr>
-            <a:endParaRPr lang="en-US" sz="2400" dirty="0">
-              <a:solidFill>
-                <a:schemeClr val="bg1"/>
-              </a:solidFill>
-            </a:endParaRPr>
-          </a:p>
-        </p:txBody>
-      </p:sp>
-    </p:spTree>
-    <p:extLst>
-      <p:ext uri="{BB962C8B-B14F-4D97-AF65-F5344CB8AC3E}">
-        <p14:creationId xmlns:p14="http://schemas.microsoft.com/office/powerpoint/2010/main" val="2274920983"/>
-      </p:ext>
-    </p:extLst>
-  </p:cSld>
-  <p:clrMapOvr>
-    <a:masterClrMapping/>
-  </p:clrMapOvr>
-</p:sld>
-</file>
-
-<file path=ppt/slides/slide9.xml><?xml version="1.0" encoding="utf-8"?>
-<p:sld xmlns:a="http://schemas.openxmlformats.org/drawingml/2006/main" xmlns:r="http://schemas.openxmlformats.org/officeDocument/2006/relationships" xmlns:p="http://schemas.openxmlformats.org/presentationml/2006/main">
-  <p:cSld>
-    <p:spTree>
-      <p:nvGrpSpPr>
-        <p:cNvPr id="1" name=""/>
-        <p:cNvGrpSpPr/>
-        <p:nvPr/>
-      </p:nvGrpSpPr>
-      <p:grpSpPr>
-        <a:xfrm>
-          <a:off x="0" y="0"/>
-          <a:ext cx="0" cy="0"/>
-          <a:chOff x="0" y="0"/>
-          <a:chExt cx="0" cy="0"/>
-        </a:xfrm>
-      </p:grpSpPr>
-      <p:sp>
-        <p:nvSpPr>
-          <p:cNvPr id="2" name="Title 1">
-            <a:extLst>
-              <a:ext uri="{FF2B5EF4-FFF2-40B4-BE49-F238E27FC236}">
-                <a16:creationId xmlns:a16="http://schemas.microsoft.com/office/drawing/2014/main" id="{00846977-A750-4BB6-9AE6-AEB2DC7066DF}"/>
-              </a:ext>
-            </a:extLst>
-          </p:cNvPr>
-          <p:cNvSpPr>
-            <a:spLocks noGrp="1"/>
-          </p:cNvSpPr>
-          <p:nvPr>
-            <p:ph type="title"/>
-          </p:nvPr>
-        </p:nvSpPr>
-        <p:spPr>
-          <a:xfrm>
-            <a:off x="684212" y="703874"/>
-            <a:ext cx="8534400" cy="1507067"/>
-          </a:xfrm>
-        </p:spPr>
-        <p:txBody>
-          <a:bodyPr/>
-          <a:lstStyle/>
-          <a:p>
-            <a:r>
-              <a:rPr lang="en-US" dirty="0"/>
-              <a:t>What we learned</a:t>
-            </a:r>
-          </a:p>
-        </p:txBody>
-      </p:sp>
-      <p:sp>
-        <p:nvSpPr>
-          <p:cNvPr id="3" name="Content Placeholder 2">
-            <a:extLst>
-              <a:ext uri="{FF2B5EF4-FFF2-40B4-BE49-F238E27FC236}">
-                <a16:creationId xmlns:a16="http://schemas.microsoft.com/office/drawing/2014/main" id="{F97BA237-BBF0-49FD-B184-71910E0D1F83}"/>
-              </a:ext>
-            </a:extLst>
-          </p:cNvPr>
-          <p:cNvSpPr>
-            <a:spLocks noGrp="1"/>
-          </p:cNvSpPr>
-          <p:nvPr>
-            <p:ph idx="1"/>
-          </p:nvPr>
-        </p:nvSpPr>
-        <p:spPr>
-          <a:xfrm>
-            <a:off x="684212" y="2393878"/>
-            <a:ext cx="8534400" cy="2482541"/>
-          </a:xfrm>
-        </p:spPr>
-        <p:txBody>
-          <a:bodyPr>
-            <a:normAutofit/>
-          </a:bodyPr>
-          <a:lstStyle/>
-          <a:p>
-            <a:pPr marL="457200" indent="-457200">
-              <a:buClrTx/>
-              <a:buFont typeface="+mj-lt"/>
-              <a:buAutoNum type="arabicPeriod"/>
-            </a:pPr>
-            <a:r>
-              <a:rPr lang="en-US" sz="2400" dirty="0">
-                <a:solidFill>
-                  <a:schemeClr val="bg1"/>
-                </a:solidFill>
-              </a:rPr>
-              <a:t>Conclusions from Questions …</a:t>
-            </a:r>
-          </a:p>
-          <a:p>
-            <a:pPr marL="457200" indent="-457200">
-              <a:buClrTx/>
-              <a:buFont typeface="+mj-lt"/>
-              <a:buAutoNum type="arabicPeriod"/>
-            </a:pPr>
-            <a:r>
-              <a:rPr lang="en-US" sz="2400" dirty="0">
-                <a:solidFill>
-                  <a:schemeClr val="bg1"/>
-                </a:solidFill>
-              </a:rPr>
-              <a:t>Scala is your friend</a:t>
-            </a:r>
-          </a:p>
-        </p:txBody>
-      </p:sp>
-    </p:spTree>
-    <p:extLst>
-      <p:ext uri="{BB962C8B-B14F-4D97-AF65-F5344CB8AC3E}">
-        <p14:creationId xmlns:p14="http://schemas.microsoft.com/office/powerpoint/2010/main" val="4198274045"/>
       </p:ext>
     </p:extLst>
   </p:cSld>
@@ -7207,4 +8621,265 @@
     </a:ext>
   </a:extLst>
 </a:theme>
+</file>
+
+<file path=ppt/theme/theme2.xml><?xml version="1.0" encoding="utf-8"?>
+<a:theme xmlns:a="http://schemas.openxmlformats.org/drawingml/2006/main" name="Office Theme">
+  <a:themeElements>
+    <a:clrScheme name="Office">
+      <a:dk1>
+        <a:sysClr val="windowText" lastClr="000000"/>
+      </a:dk1>
+      <a:lt1>
+        <a:sysClr val="window" lastClr="FFFFFF"/>
+      </a:lt1>
+      <a:dk2>
+        <a:srgbClr val="44546A"/>
+      </a:dk2>
+      <a:lt2>
+        <a:srgbClr val="E7E6E6"/>
+      </a:lt2>
+      <a:accent1>
+        <a:srgbClr val="4472C4"/>
+      </a:accent1>
+      <a:accent2>
+        <a:srgbClr val="ED7D31"/>
+      </a:accent2>
+      <a:accent3>
+        <a:srgbClr val="A5A5A5"/>
+      </a:accent3>
+      <a:accent4>
+        <a:srgbClr val="FFC000"/>
+      </a:accent4>
+      <a:accent5>
+        <a:srgbClr val="5B9BD5"/>
+      </a:accent5>
+      <a:accent6>
+        <a:srgbClr val="70AD47"/>
+      </a:accent6>
+      <a:hlink>
+        <a:srgbClr val="0563C1"/>
+      </a:hlink>
+      <a:folHlink>
+        <a:srgbClr val="954F72"/>
+      </a:folHlink>
+    </a:clrScheme>
+    <a:fontScheme name="Office">
+      <a:majorFont>
+        <a:latin typeface="Calibri Light" panose="020F0302020204030204"/>
+        <a:ea typeface=""/>
+        <a:cs typeface=""/>
+        <a:font script="Jpan" typeface="Yu Gothic Light"/>
+        <a:font script="Hang" typeface="맑은 고딕"/>
+        <a:font script="Hans" typeface="DengXian Light"/>
+        <a:font script="Hant" typeface="新細明體"/>
+        <a:font script="Arab" typeface="Times New Roman"/>
+        <a:font script="Hebr" typeface="Times New Roman"/>
+        <a:font script="Thai" typeface="Angsana New"/>
+        <a:font script="Ethi" typeface="Nyala"/>
+        <a:font script="Beng" typeface="Vrinda"/>
+        <a:font script="Gujr" typeface="Shruti"/>
+        <a:font script="Khmr" typeface="MoolBoran"/>
+        <a:font script="Knda" typeface="Tunga"/>
+        <a:font script="Guru" typeface="Raavi"/>
+        <a:font script="Cans" typeface="Euphemia"/>
+        <a:font script="Cher" typeface="Plantagenet Cherokee"/>
+        <a:font script="Yiii" typeface="Microsoft Yi Baiti"/>
+        <a:font script="Tibt" typeface="Microsoft Himalaya"/>
+        <a:font script="Thaa" typeface="MV Boli"/>
+        <a:font script="Deva" typeface="Mangal"/>
+        <a:font script="Telu" typeface="Gautami"/>
+        <a:font script="Taml" typeface="Latha"/>
+        <a:font script="Syrc" typeface="Estrangelo Edessa"/>
+        <a:font script="Orya" typeface="Kalinga"/>
+        <a:font script="Mlym" typeface="Kartika"/>
+        <a:font script="Laoo" typeface="DokChampa"/>
+        <a:font script="Sinh" typeface="Iskoola Pota"/>
+        <a:font script="Mong" typeface="Mongolian Baiti"/>
+        <a:font script="Viet" typeface="Times New Roman"/>
+        <a:font script="Uigh" typeface="Microsoft Uighur"/>
+        <a:font script="Geor" typeface="Sylfaen"/>
+      </a:majorFont>
+      <a:minorFont>
+        <a:latin typeface="Calibri" panose="020F0502020204030204"/>
+        <a:ea typeface=""/>
+        <a:cs typeface=""/>
+        <a:font script="Jpan" typeface="Yu Gothic"/>
+        <a:font script="Hang" typeface="맑은 고딕"/>
+        <a:font script="Hans" typeface="DengXian"/>
+        <a:font script="Hant" typeface="新細明體"/>
+        <a:font script="Arab" typeface="Arial"/>
+        <a:font script="Hebr" typeface="Arial"/>
+        <a:font script="Thai" typeface="Cordia New"/>
+        <a:font script="Ethi" typeface="Nyala"/>
+        <a:font script="Beng" typeface="Vrinda"/>
+        <a:font script="Gujr" typeface="Shruti"/>
+        <a:font script="Khmr" typeface="DaunPenh"/>
+        <a:font script="Knda" typeface="Tunga"/>
+        <a:font script="Guru" typeface="Raavi"/>
+        <a:font script="Cans" typeface="Euphemia"/>
+        <a:font script="Cher" typeface="Plantagenet Cherokee"/>
+        <a:font script="Yiii" typeface="Microsoft Yi Baiti"/>
+        <a:font script="Tibt" typeface="Microsoft Himalaya"/>
+        <a:font script="Thaa" typeface="MV Boli"/>
+        <a:font script="Deva" typeface="Mangal"/>
+        <a:font script="Telu" typeface="Gautami"/>
+        <a:font script="Taml" typeface="Latha"/>
+        <a:font script="Syrc" typeface="Estrangelo Edessa"/>
+        <a:font script="Orya" typeface="Kalinga"/>
+        <a:font script="Mlym" typeface="Kartika"/>
+        <a:font script="Laoo" typeface="DokChampa"/>
+        <a:font script="Sinh" typeface="Iskoola Pota"/>
+        <a:font script="Mong" typeface="Mongolian Baiti"/>
+        <a:font script="Viet" typeface="Arial"/>
+        <a:font script="Uigh" typeface="Microsoft Uighur"/>
+        <a:font script="Geor" typeface="Sylfaen"/>
+      </a:minorFont>
+    </a:fontScheme>
+    <a:fmtScheme name="Office">
+      <a:fillStyleLst>
+        <a:solidFill>
+          <a:schemeClr val="phClr"/>
+        </a:solidFill>
+        <a:gradFill rotWithShape="1">
+          <a:gsLst>
+            <a:gs pos="0">
+              <a:schemeClr val="phClr">
+                <a:lumMod val="110000"/>
+                <a:satMod val="105000"/>
+                <a:tint val="67000"/>
+              </a:schemeClr>
+            </a:gs>
+            <a:gs pos="50000">
+              <a:schemeClr val="phClr">
+                <a:lumMod val="105000"/>
+                <a:satMod val="103000"/>
+                <a:tint val="73000"/>
+              </a:schemeClr>
+            </a:gs>
+            <a:gs pos="100000">
+              <a:schemeClr val="phClr">
+                <a:lumMod val="105000"/>
+                <a:satMod val="109000"/>
+                <a:tint val="81000"/>
+              </a:schemeClr>
+            </a:gs>
+          </a:gsLst>
+          <a:lin ang="5400000" scaled="0"/>
+        </a:gradFill>
+        <a:gradFill rotWithShape="1">
+          <a:gsLst>
+            <a:gs pos="0">
+              <a:schemeClr val="phClr">
+                <a:satMod val="103000"/>
+                <a:lumMod val="102000"/>
+                <a:tint val="94000"/>
+              </a:schemeClr>
+            </a:gs>
+            <a:gs pos="50000">
+              <a:schemeClr val="phClr">
+                <a:satMod val="110000"/>
+                <a:lumMod val="100000"/>
+                <a:shade val="100000"/>
+              </a:schemeClr>
+            </a:gs>
+            <a:gs pos="100000">
+              <a:schemeClr val="phClr">
+                <a:lumMod val="99000"/>
+                <a:satMod val="120000"/>
+                <a:shade val="78000"/>
+              </a:schemeClr>
+            </a:gs>
+          </a:gsLst>
+          <a:lin ang="5400000" scaled="0"/>
+        </a:gradFill>
+      </a:fillStyleLst>
+      <a:lnStyleLst>
+        <a:ln w="6350" cap="flat" cmpd="sng" algn="ctr">
+          <a:solidFill>
+            <a:schemeClr val="phClr"/>
+          </a:solidFill>
+          <a:prstDash val="solid"/>
+          <a:miter lim="800000"/>
+        </a:ln>
+        <a:ln w="12700" cap="flat" cmpd="sng" algn="ctr">
+          <a:solidFill>
+            <a:schemeClr val="phClr"/>
+          </a:solidFill>
+          <a:prstDash val="solid"/>
+          <a:miter lim="800000"/>
+        </a:ln>
+        <a:ln w="19050" cap="flat" cmpd="sng" algn="ctr">
+          <a:solidFill>
+            <a:schemeClr val="phClr"/>
+          </a:solidFill>
+          <a:prstDash val="solid"/>
+          <a:miter lim="800000"/>
+        </a:ln>
+      </a:lnStyleLst>
+      <a:effectStyleLst>
+        <a:effectStyle>
+          <a:effectLst/>
+        </a:effectStyle>
+        <a:effectStyle>
+          <a:effectLst/>
+        </a:effectStyle>
+        <a:effectStyle>
+          <a:effectLst>
+            <a:outerShdw blurRad="57150" dist="19050" dir="5400000" algn="ctr" rotWithShape="0">
+              <a:srgbClr val="000000">
+                <a:alpha val="63000"/>
+              </a:srgbClr>
+            </a:outerShdw>
+          </a:effectLst>
+        </a:effectStyle>
+      </a:effectStyleLst>
+      <a:bgFillStyleLst>
+        <a:solidFill>
+          <a:schemeClr val="phClr"/>
+        </a:solidFill>
+        <a:solidFill>
+          <a:schemeClr val="phClr">
+            <a:tint val="95000"/>
+            <a:satMod val="170000"/>
+          </a:schemeClr>
+        </a:solidFill>
+        <a:gradFill rotWithShape="1">
+          <a:gsLst>
+            <a:gs pos="0">
+              <a:schemeClr val="phClr">
+                <a:tint val="93000"/>
+                <a:satMod val="150000"/>
+                <a:shade val="98000"/>
+                <a:lumMod val="102000"/>
+              </a:schemeClr>
+            </a:gs>
+            <a:gs pos="50000">
+              <a:schemeClr val="phClr">
+                <a:tint val="98000"/>
+                <a:satMod val="130000"/>
+                <a:shade val="90000"/>
+                <a:lumMod val="103000"/>
+              </a:schemeClr>
+            </a:gs>
+            <a:gs pos="100000">
+              <a:schemeClr val="phClr">
+                <a:shade val="63000"/>
+                <a:satMod val="120000"/>
+              </a:schemeClr>
+            </a:gs>
+          </a:gsLst>
+          <a:lin ang="5400000" scaled="0"/>
+        </a:gradFill>
+      </a:bgFillStyleLst>
+    </a:fmtScheme>
+  </a:themeElements>
+  <a:objectDefaults/>
+  <a:extraClrSchemeLst/>
+  <a:extLst>
+    <a:ext uri="{05A4C25C-085E-4340-85A3-A5531E510DB2}">
+      <thm15:themeFamily xmlns:thm15="http://schemas.microsoft.com/office/thememl/2012/main" name="Office Theme" id="{62F939B6-93AF-4DB8-9C6B-D6C7DFDC589F}" vid="{4A3C46E8-61CC-4603-A589-7422A47A8E4A}"/>
+    </a:ext>
+  </a:extLst>
+</a:theme>
 </file>
</xml_diff>